<commit_message>
fixed figure 2a layout and labels
</commit_message>
<xml_diff>
--- a/main_figures/Figures_Challenge1.pptx
+++ b/main_figures/Figures_Challenge1.pptx
@@ -3407,87 +3407,6 @@
           <a:chExt cx="0" cy="0"/>
         </a:xfrm>
       </p:grpSpPr>
-      <p:grpSp>
-        <p:nvGrpSpPr>
-          <p:cNvPr id="25" name="Group 24">
-            <a:extLst>
-              <a:ext uri="{FF2B5EF4-FFF2-40B4-BE49-F238E27FC236}">
-                <a16:creationId xmlns:a16="http://schemas.microsoft.com/office/drawing/2014/main" id="{F31D26F6-BE84-FAA3-48DF-A76F363D9706}"/>
-              </a:ext>
-            </a:extLst>
-          </p:cNvPr>
-          <p:cNvGrpSpPr/>
-          <p:nvPr/>
-        </p:nvGrpSpPr>
-        <p:grpSpPr>
-          <a:xfrm>
-            <a:off x="3794760" y="1883664"/>
-            <a:ext cx="2770632" cy="1682496"/>
-            <a:chOff x="3794760" y="1883664"/>
-            <a:chExt cx="2770632" cy="1682496"/>
-          </a:xfrm>
-        </p:grpSpPr>
-        <p:pic>
-          <p:nvPicPr>
-            <p:cNvPr id="24" name="Picture 23">
-              <a:extLst>
-                <a:ext uri="{FF2B5EF4-FFF2-40B4-BE49-F238E27FC236}">
-                  <a16:creationId xmlns:a16="http://schemas.microsoft.com/office/drawing/2014/main" id="{07C6556B-41CC-216C-76F0-8BE0654811F5}"/>
-                </a:ext>
-              </a:extLst>
-            </p:cNvPr>
-            <p:cNvPicPr>
-              <a:picLocks noChangeAspect="1"/>
-            </p:cNvPicPr>
-            <p:nvPr/>
-          </p:nvPicPr>
-          <p:blipFill>
-            <a:blip r:embed="rId3"/>
-            <a:stretch>
-              <a:fillRect/>
-            </a:stretch>
-          </p:blipFill>
-          <p:spPr>
-            <a:xfrm>
-              <a:off x="5541264" y="1929384"/>
-              <a:ext cx="1024128" cy="1024128"/>
-            </a:xfrm>
-            <a:prstGeom prst="rect">
-              <a:avLst/>
-            </a:prstGeom>
-          </p:spPr>
-        </p:pic>
-        <p:pic>
-          <p:nvPicPr>
-            <p:cNvPr id="22" name="Picture 21">
-              <a:extLst>
-                <a:ext uri="{FF2B5EF4-FFF2-40B4-BE49-F238E27FC236}">
-                  <a16:creationId xmlns:a16="http://schemas.microsoft.com/office/drawing/2014/main" id="{AB08B937-2FF1-84E3-6F3F-737E2F038252}"/>
-                </a:ext>
-              </a:extLst>
-            </p:cNvPr>
-            <p:cNvPicPr>
-              <a:picLocks noChangeAspect="1"/>
-            </p:cNvPicPr>
-            <p:nvPr/>
-          </p:nvPicPr>
-          <p:blipFill>
-            <a:blip r:embed="rId4"/>
-            <a:stretch>
-              <a:fillRect/>
-            </a:stretch>
-          </p:blipFill>
-          <p:spPr>
-            <a:xfrm>
-              <a:off x="3794760" y="1883664"/>
-              <a:ext cx="1682496" cy="1682496"/>
-            </a:xfrm>
-            <a:prstGeom prst="rect">
-              <a:avLst/>
-            </a:prstGeom>
-          </p:spPr>
-        </p:pic>
-      </p:grpSp>
       <p:pic>
         <p:nvPicPr>
           <p:cNvPr id="32" name="Graphic 31">
@@ -3503,10 +3422,10 @@
           <p:nvPr/>
         </p:nvPicPr>
         <p:blipFill rotWithShape="1">
-          <a:blip r:embed="rId5">
+          <a:blip r:embed="rId3">
             <a:extLst>
               <a:ext uri="{96DAC541-7B7A-43D3-8B79-37D633B846F1}">
-                <asvg:svgBlip xmlns:asvg="http://schemas.microsoft.com/office/drawing/2016/SVG/main" r:embed="rId6"/>
+                <asvg:svgBlip xmlns:asvg="http://schemas.microsoft.com/office/drawing/2016/SVG/main" r:embed="rId4"/>
               </a:ext>
             </a:extLst>
           </a:blip>
@@ -3538,10 +3457,10 @@
           <p:nvPr/>
         </p:nvPicPr>
         <p:blipFill rotWithShape="1">
-          <a:blip r:embed="rId7">
+          <a:blip r:embed="rId5">
             <a:extLst>
               <a:ext uri="{96DAC541-7B7A-43D3-8B79-37D633B846F1}">
-                <asvg:svgBlip xmlns:asvg="http://schemas.microsoft.com/office/drawing/2016/SVG/main" r:embed="rId8"/>
+                <asvg:svgBlip xmlns:asvg="http://schemas.microsoft.com/office/drawing/2016/SVG/main" r:embed="rId6"/>
               </a:ext>
             </a:extLst>
           </a:blip>
@@ -3558,12 +3477,436 @@
           </a:prstGeom>
         </p:spPr>
       </p:pic>
+      <p:sp>
+        <p:nvSpPr>
+          <p:cNvPr id="130" name="矩形 129"/>
+          <p:cNvSpPr/>
+          <p:nvPr/>
+        </p:nvSpPr>
+        <p:spPr>
+          <a:xfrm>
+            <a:off x="26793" y="9209855"/>
+            <a:ext cx="6831207" cy="707886"/>
+          </a:xfrm>
+          <a:prstGeom prst="rect">
+            <a:avLst/>
+          </a:prstGeom>
+        </p:spPr>
+        <p:txBody>
+          <a:bodyPr wrap="square">
+            <a:spAutoFit/>
+          </a:bodyPr>
+          <a:lstStyle/>
+          <a:p>
+            <a:r>
+              <a:rPr lang="en-US" altLang="zh-CN" sz="800" b="1">
+                <a:solidFill>
+                  <a:srgbClr val="C00000"/>
+                </a:solidFill>
+                <a:latin typeface="Arial" pitchFamily="34" charset="0"/>
+                <a:cs typeface="Arial" pitchFamily="34" charset="0"/>
+              </a:rPr>
+              <a:t>Figure 2:</a:t>
+            </a:r>
+            <a:r>
+              <a:rPr lang="en-US" altLang="zh-CN" sz="800" b="1">
+                <a:latin typeface="Arial" pitchFamily="34" charset="0"/>
+                <a:cs typeface="Arial" pitchFamily="34" charset="0"/>
+              </a:rPr>
+              <a:t> </a:t>
+            </a:r>
+            <a:r>
+              <a:rPr lang="en-US" altLang="zh-CN" sz="800" b="1" dirty="0">
+                <a:latin typeface="Arial" pitchFamily="34" charset="0"/>
+                <a:cs typeface="Arial" pitchFamily="34" charset="0"/>
+              </a:rPr>
+              <a:t>Overview of evaluation for Challenge 1: transcript identification with a reference annotation. a) </a:t>
+            </a:r>
+            <a:r>
+              <a:rPr lang="en-US" altLang="zh-CN" sz="800" dirty="0">
+                <a:latin typeface="Arial" pitchFamily="34" charset="0"/>
+                <a:cs typeface="Arial" pitchFamily="34" charset="0"/>
+              </a:rPr>
+              <a:t>Number of genes and transcripts per submission. Abundance of the main structural categories and support by external data. b) Agreement in transcript detection as a function the number of detecting pipelines. c) Performance based on for spliced-short and </a:t>
+            </a:r>
+            <a:r>
+              <a:rPr lang="en-US" altLang="zh-CN" sz="800" dirty="0" err="1">
+                <a:latin typeface="Arial" pitchFamily="34" charset="0"/>
+                <a:cs typeface="Arial" pitchFamily="34" charset="0"/>
+              </a:rPr>
+              <a:t>unspliced</a:t>
+            </a:r>
+            <a:r>
+              <a:rPr lang="en-US" altLang="zh-CN" sz="800" dirty="0">
+                <a:latin typeface="Arial" pitchFamily="34" charset="0"/>
+                <a:cs typeface="Arial" pitchFamily="34" charset="0"/>
+              </a:rPr>
+              <a:t>-long SIRVs. d) Performance based on simulated data. e) Performance for known and novel transcripts based on  50 manually-annotated genes by GENCODE. Ba: Bambu, FM: Flames, FR: FLAIR, IQ: IsoQuant, IT: IsoTools, IB: Iso_IB, Ly: LyRic, Ma: Mandalorion, TL: TALON-LAPA, </a:t>
+            </a:r>
+            <a:r>
+              <a:rPr lang="en-US" altLang="zh-CN" sz="800" dirty="0" err="1">
+                <a:latin typeface="Arial" pitchFamily="34" charset="0"/>
+                <a:cs typeface="Arial" pitchFamily="34" charset="0"/>
+              </a:rPr>
+              <a:t>Sp</a:t>
+            </a:r>
+            <a:r>
+              <a:rPr lang="en-US" altLang="zh-CN" sz="800" dirty="0">
+                <a:latin typeface="Arial" pitchFamily="34" charset="0"/>
+                <a:cs typeface="Arial" pitchFamily="34" charset="0"/>
+              </a:rPr>
+              <a:t>: Spectra, ST: StringTie2.</a:t>
+            </a:r>
+          </a:p>
+        </p:txBody>
+      </p:sp>
+      <p:sp>
+        <p:nvSpPr>
+          <p:cNvPr id="141" name="TextBox 180">
+            <a:extLst>
+              <a:ext uri="{FF2B5EF4-FFF2-40B4-BE49-F238E27FC236}">
+                <a16:creationId xmlns:a16="http://schemas.microsoft.com/office/drawing/2014/main" id="{D81EE273-87D2-6248-9C05-C2AC7A38C86F}"/>
+              </a:ext>
+            </a:extLst>
+          </p:cNvPr>
+          <p:cNvSpPr txBox="1"/>
+          <p:nvPr/>
+        </p:nvSpPr>
+        <p:spPr>
+          <a:xfrm>
+            <a:off x="61611" y="4914844"/>
+            <a:ext cx="207640" cy="215444"/>
+          </a:xfrm>
+          <a:prstGeom prst="rect">
+            <a:avLst/>
+          </a:prstGeom>
+          <a:noFill/>
+        </p:spPr>
+        <p:txBody>
+          <a:bodyPr wrap="square" lIns="0" tIns="0" rIns="0" bIns="0" rtlCol="0">
+            <a:spAutoFit/>
+          </a:bodyPr>
+          <a:lstStyle/>
+          <a:p>
+            <a:r>
+              <a:rPr lang="en-US" sz="1400" b="1" dirty="0">
+                <a:latin typeface="Arial" pitchFamily="34" charset="0"/>
+                <a:cs typeface="Arial" pitchFamily="34" charset="0"/>
+              </a:rPr>
+              <a:t>d</a:t>
+            </a:r>
+            <a:endParaRPr lang="x-none" sz="1400" b="1" dirty="0">
+              <a:latin typeface="Arial" pitchFamily="34" charset="0"/>
+              <a:cs typeface="Arial" pitchFamily="34" charset="0"/>
+            </a:endParaRPr>
+          </a:p>
+        </p:txBody>
+      </p:sp>
+      <p:sp>
+        <p:nvSpPr>
+          <p:cNvPr id="98" name="TextBox 180">
+            <a:extLst>
+              <a:ext uri="{FF2B5EF4-FFF2-40B4-BE49-F238E27FC236}">
+                <a16:creationId xmlns:a16="http://schemas.microsoft.com/office/drawing/2014/main" id="{ACF6B259-DD77-1F49-A63F-7D4D37EE33F1}"/>
+              </a:ext>
+            </a:extLst>
+          </p:cNvPr>
+          <p:cNvSpPr txBox="1"/>
+          <p:nvPr/>
+        </p:nvSpPr>
+        <p:spPr>
+          <a:xfrm>
+            <a:off x="61611" y="3571836"/>
+            <a:ext cx="122258" cy="215444"/>
+          </a:xfrm>
+          <a:prstGeom prst="rect">
+            <a:avLst/>
+          </a:prstGeom>
+          <a:noFill/>
+        </p:spPr>
+        <p:txBody>
+          <a:bodyPr wrap="square" lIns="0" tIns="0" rIns="0" bIns="0" rtlCol="0">
+            <a:spAutoFit/>
+          </a:bodyPr>
+          <a:lstStyle/>
+          <a:p>
+            <a:r>
+              <a:rPr lang="en-US" sz="1400" b="1" dirty="0">
+                <a:latin typeface="Arial" pitchFamily="34" charset="0"/>
+                <a:cs typeface="Arial" pitchFamily="34" charset="0"/>
+              </a:rPr>
+              <a:t>b</a:t>
+            </a:r>
+            <a:endParaRPr lang="x-none" sz="1400" b="1" dirty="0">
+              <a:latin typeface="Arial" pitchFamily="34" charset="0"/>
+              <a:cs typeface="Arial" pitchFamily="34" charset="0"/>
+            </a:endParaRPr>
+          </a:p>
+        </p:txBody>
+      </p:sp>
+      <p:pic>
+        <p:nvPicPr>
+          <p:cNvPr id="80" name="Gráfico 79">
+            <a:extLst>
+              <a:ext uri="{FF2B5EF4-FFF2-40B4-BE49-F238E27FC236}">
+                <a16:creationId xmlns:a16="http://schemas.microsoft.com/office/drawing/2014/main" id="{406107A0-8EAD-2F41-A9B7-D87D4647806A}"/>
+              </a:ext>
+            </a:extLst>
+          </p:cNvPr>
+          <p:cNvPicPr>
+            <a:picLocks noChangeAspect="1"/>
+          </p:cNvPicPr>
+          <p:nvPr/>
+        </p:nvPicPr>
+        <p:blipFill rotWithShape="1">
+          <a:blip r:embed="rId7">
+            <a:extLst>
+              <a:ext uri="{96DAC541-7B7A-43D3-8B79-37D633B846F1}">
+                <asvg:svgBlip xmlns:asvg="http://schemas.microsoft.com/office/drawing/2016/SVG/main" r:embed="rId8"/>
+              </a:ext>
+            </a:extLst>
+          </a:blip>
+          <a:srcRect l="8078" t="46581" b="42876"/>
+          <a:stretch/>
+        </p:blipFill>
+        <p:spPr>
+          <a:xfrm>
+            <a:off x="250716" y="6603306"/>
+            <a:ext cx="2978269" cy="170794"/>
+          </a:xfrm>
+          <a:prstGeom prst="rect">
+            <a:avLst/>
+          </a:prstGeom>
+        </p:spPr>
+      </p:pic>
+      <p:sp>
+        <p:nvSpPr>
+          <p:cNvPr id="115" name="TextBox 180">
+            <a:extLst>
+              <a:ext uri="{FF2B5EF4-FFF2-40B4-BE49-F238E27FC236}">
+                <a16:creationId xmlns:a16="http://schemas.microsoft.com/office/drawing/2014/main" id="{205C7F67-F245-EC47-9D99-A3BB306738FB}"/>
+              </a:ext>
+            </a:extLst>
+          </p:cNvPr>
+          <p:cNvSpPr txBox="1"/>
+          <p:nvPr/>
+        </p:nvSpPr>
+        <p:spPr>
+          <a:xfrm>
+            <a:off x="61611" y="6875441"/>
+            <a:ext cx="207640" cy="215444"/>
+          </a:xfrm>
+          <a:prstGeom prst="rect">
+            <a:avLst/>
+          </a:prstGeom>
+          <a:noFill/>
+        </p:spPr>
+        <p:txBody>
+          <a:bodyPr wrap="square" lIns="0" tIns="0" rIns="0" bIns="0" rtlCol="0">
+            <a:spAutoFit/>
+          </a:bodyPr>
+          <a:lstStyle/>
+          <a:p>
+            <a:r>
+              <a:rPr lang="en-US" sz="1400" b="1" dirty="0">
+                <a:latin typeface="Arial" pitchFamily="34" charset="0"/>
+                <a:cs typeface="Arial" pitchFamily="34" charset="0"/>
+              </a:rPr>
+              <a:t>e</a:t>
+            </a:r>
+            <a:endParaRPr lang="x-none" sz="1400" b="1" dirty="0">
+              <a:latin typeface="Arial" pitchFamily="34" charset="0"/>
+              <a:cs typeface="Arial" pitchFamily="34" charset="0"/>
+            </a:endParaRPr>
+          </a:p>
+        </p:txBody>
+      </p:sp>
+      <p:pic>
+        <p:nvPicPr>
+          <p:cNvPr id="14" name="Picture 13">
+            <a:extLst>
+              <a:ext uri="{FF2B5EF4-FFF2-40B4-BE49-F238E27FC236}">
+                <a16:creationId xmlns:a16="http://schemas.microsoft.com/office/drawing/2014/main" id="{BB1CE44E-7743-1D16-33DF-69EE1E93CD1B}"/>
+              </a:ext>
+            </a:extLst>
+          </p:cNvPr>
+          <p:cNvPicPr>
+            <a:picLocks noChangeAspect="1"/>
+          </p:cNvPicPr>
+          <p:nvPr/>
+        </p:nvPicPr>
+        <p:blipFill rotWithShape="1">
+          <a:blip r:embed="rId9"/>
+          <a:srcRect b="26859"/>
+          <a:stretch/>
+        </p:blipFill>
+        <p:spPr>
+          <a:xfrm>
+            <a:off x="384645" y="5062454"/>
+            <a:ext cx="2633338" cy="1540852"/>
+          </a:xfrm>
+          <a:prstGeom prst="rect">
+            <a:avLst/>
+          </a:prstGeom>
+        </p:spPr>
+      </p:pic>
+      <p:pic>
+        <p:nvPicPr>
+          <p:cNvPr id="20" name="Graphic 19">
+            <a:extLst>
+              <a:ext uri="{FF2B5EF4-FFF2-40B4-BE49-F238E27FC236}">
+                <a16:creationId xmlns:a16="http://schemas.microsoft.com/office/drawing/2014/main" id="{2B17FD3C-EDDE-B3BC-7118-AB90F6A12581}"/>
+              </a:ext>
+            </a:extLst>
+          </p:cNvPr>
+          <p:cNvPicPr>
+            <a:picLocks noChangeAspect="1"/>
+          </p:cNvPicPr>
+          <p:nvPr/>
+        </p:nvPicPr>
+        <p:blipFill>
+          <a:blip r:embed="rId10">
+            <a:extLst>
+              <a:ext uri="{96DAC541-7B7A-43D3-8B79-37D633B846F1}">
+                <asvg:svgBlip xmlns:asvg="http://schemas.microsoft.com/office/drawing/2016/SVG/main" r:embed="rId11"/>
+              </a:ext>
+            </a:extLst>
+          </a:blip>
+          <a:stretch>
+            <a:fillRect/>
+          </a:stretch>
+        </p:blipFill>
+        <p:spPr>
+          <a:xfrm>
+            <a:off x="330826" y="3576798"/>
+            <a:ext cx="2740976" cy="1370488"/>
+          </a:xfrm>
+          <a:prstGeom prst="rect">
+            <a:avLst/>
+          </a:prstGeom>
+        </p:spPr>
+      </p:pic>
+      <p:sp>
+        <p:nvSpPr>
+          <p:cNvPr id="140" name="TextBox 180">
+            <a:extLst>
+              <a:ext uri="{FF2B5EF4-FFF2-40B4-BE49-F238E27FC236}">
+                <a16:creationId xmlns:a16="http://schemas.microsoft.com/office/drawing/2014/main" id="{96028256-02F2-314F-9D9F-0DEB18CE39A0}"/>
+              </a:ext>
+            </a:extLst>
+          </p:cNvPr>
+          <p:cNvSpPr txBox="1"/>
+          <p:nvPr/>
+        </p:nvSpPr>
+        <p:spPr>
+          <a:xfrm>
+            <a:off x="3212733" y="3564145"/>
+            <a:ext cx="207640" cy="215444"/>
+          </a:xfrm>
+          <a:prstGeom prst="rect">
+            <a:avLst/>
+          </a:prstGeom>
+          <a:noFill/>
+        </p:spPr>
+        <p:txBody>
+          <a:bodyPr wrap="square" lIns="0" tIns="0" rIns="0" bIns="0" rtlCol="0">
+            <a:spAutoFit/>
+          </a:bodyPr>
+          <a:lstStyle/>
+          <a:p>
+            <a:r>
+              <a:rPr lang="en-US" sz="1400" b="1" dirty="0">
+                <a:latin typeface="Arial" pitchFamily="34" charset="0"/>
+                <a:cs typeface="Arial" pitchFamily="34" charset="0"/>
+              </a:rPr>
+              <a:t>c</a:t>
+            </a:r>
+            <a:endParaRPr lang="x-none" sz="1400" b="1" dirty="0">
+              <a:latin typeface="Arial" pitchFamily="34" charset="0"/>
+              <a:cs typeface="Arial" pitchFamily="34" charset="0"/>
+            </a:endParaRPr>
+          </a:p>
+        </p:txBody>
+      </p:sp>
+      <p:cxnSp>
+        <p:nvCxnSpPr>
+          <p:cNvPr id="29" name="Straight Connector 28">
+            <a:extLst>
+              <a:ext uri="{FF2B5EF4-FFF2-40B4-BE49-F238E27FC236}">
+                <a16:creationId xmlns:a16="http://schemas.microsoft.com/office/drawing/2014/main" id="{F3CBBC70-466C-0C59-C00C-7D8D51D320B5}"/>
+              </a:ext>
+            </a:extLst>
+          </p:cNvPr>
+          <p:cNvCxnSpPr>
+            <a:cxnSpLocks/>
+          </p:cNvCxnSpPr>
+          <p:nvPr/>
+        </p:nvCxnSpPr>
+        <p:spPr>
+          <a:xfrm>
+            <a:off x="3409357" y="3683930"/>
+            <a:ext cx="0" cy="3004773"/>
+          </a:xfrm>
+          <a:prstGeom prst="line">
+            <a:avLst/>
+          </a:prstGeom>
+          <a:ln w="15875">
+            <a:solidFill>
+              <a:schemeClr val="bg1"/>
+            </a:solidFill>
+          </a:ln>
+        </p:spPr>
+        <p:style>
+          <a:lnRef idx="1">
+            <a:schemeClr val="accent1"/>
+          </a:lnRef>
+          <a:fillRef idx="0">
+            <a:schemeClr val="accent1"/>
+          </a:fillRef>
+          <a:effectRef idx="0">
+            <a:schemeClr val="accent1"/>
+          </a:effectRef>
+          <a:fontRef idx="minor">
+            <a:schemeClr val="tx1"/>
+          </a:fontRef>
+        </p:style>
+      </p:cxnSp>
+      <p:pic>
+        <p:nvPicPr>
+          <p:cNvPr id="3" name="Picture 2">
+            <a:extLst>
+              <a:ext uri="{FF2B5EF4-FFF2-40B4-BE49-F238E27FC236}">
+                <a16:creationId xmlns:a16="http://schemas.microsoft.com/office/drawing/2014/main" id="{C0EAD4F0-942A-0372-FA87-AC0CC5750906}"/>
+              </a:ext>
+            </a:extLst>
+          </p:cNvPr>
+          <p:cNvPicPr>
+            <a:picLocks noChangeAspect="1"/>
+          </p:cNvPicPr>
+          <p:nvPr/>
+        </p:nvPicPr>
+        <p:blipFill>
+          <a:blip r:embed="rId12"/>
+          <a:stretch>
+            <a:fillRect/>
+          </a:stretch>
+        </p:blipFill>
+        <p:spPr>
+          <a:xfrm>
+            <a:off x="269251" y="6931747"/>
+            <a:ext cx="6345722" cy="2221003"/>
+          </a:xfrm>
+          <a:prstGeom prst="rect">
+            <a:avLst/>
+          </a:prstGeom>
+        </p:spPr>
+      </p:pic>
       <p:grpSp>
         <p:nvGrpSpPr>
-          <p:cNvPr id="8" name="Group 7">
+          <p:cNvPr id="33" name="Group 32">
             <a:extLst>
               <a:ext uri="{FF2B5EF4-FFF2-40B4-BE49-F238E27FC236}">
-                <a16:creationId xmlns:a16="http://schemas.microsoft.com/office/drawing/2014/main" id="{E8396BA3-238F-C08C-E621-6C21B8C2D670}"/>
+                <a16:creationId xmlns:a16="http://schemas.microsoft.com/office/drawing/2014/main" id="{5B30CD32-0D74-7DEA-7C20-0E14CF3B30CE}"/>
               </a:ext>
             </a:extLst>
           </p:cNvPr>
@@ -3572,18 +3915,97 @@
         </p:nvGrpSpPr>
         <p:grpSpPr>
           <a:xfrm>
-            <a:off x="109728" y="156662"/>
-            <a:ext cx="1682496" cy="1727002"/>
-            <a:chOff x="109728" y="156662"/>
-            <a:chExt cx="1682496" cy="1727002"/>
+            <a:off x="109728" y="171663"/>
+            <a:ext cx="6638544" cy="3479342"/>
+            <a:chOff x="109728" y="171663"/>
+            <a:chExt cx="6638544" cy="3479342"/>
           </a:xfrm>
         </p:grpSpPr>
+        <p:grpSp>
+          <p:nvGrpSpPr>
+            <p:cNvPr id="31" name="Group 30">
+              <a:extLst>
+                <a:ext uri="{FF2B5EF4-FFF2-40B4-BE49-F238E27FC236}">
+                  <a16:creationId xmlns:a16="http://schemas.microsoft.com/office/drawing/2014/main" id="{38B4E7E4-CDF1-A363-41B5-39FC230C5B3D}"/>
+                </a:ext>
+              </a:extLst>
+            </p:cNvPr>
+            <p:cNvGrpSpPr/>
+            <p:nvPr/>
+          </p:nvGrpSpPr>
+          <p:grpSpPr>
+            <a:xfrm>
+              <a:off x="5167150" y="2828278"/>
+              <a:ext cx="1476605" cy="822727"/>
+              <a:chOff x="5385816" y="2862072"/>
+              <a:chExt cx="1476605" cy="822727"/>
+            </a:xfrm>
+          </p:grpSpPr>
+          <p:pic>
+            <p:nvPicPr>
+              <p:cNvPr id="27" name="Picture 26">
+                <a:extLst>
+                  <a:ext uri="{FF2B5EF4-FFF2-40B4-BE49-F238E27FC236}">
+                    <a16:creationId xmlns:a16="http://schemas.microsoft.com/office/drawing/2014/main" id="{A3346AAA-7D32-6F51-69A5-3E67350FDEAA}"/>
+                  </a:ext>
+                </a:extLst>
+              </p:cNvPr>
+              <p:cNvPicPr>
+                <a:picLocks noChangeAspect="1"/>
+              </p:cNvPicPr>
+              <p:nvPr/>
+            </p:nvPicPr>
+            <p:blipFill rotWithShape="1">
+              <a:blip r:embed="rId13"/>
+              <a:srcRect b="47972"/>
+              <a:stretch/>
+            </p:blipFill>
+            <p:spPr>
+              <a:xfrm>
+                <a:off x="5385816" y="2862072"/>
+                <a:ext cx="914400" cy="761191"/>
+              </a:xfrm>
+              <a:prstGeom prst="rect">
+                <a:avLst/>
+              </a:prstGeom>
+            </p:spPr>
+          </p:pic>
+          <p:pic>
+            <p:nvPicPr>
+              <p:cNvPr id="30" name="Picture 29">
+                <a:extLst>
+                  <a:ext uri="{FF2B5EF4-FFF2-40B4-BE49-F238E27FC236}">
+                    <a16:creationId xmlns:a16="http://schemas.microsoft.com/office/drawing/2014/main" id="{48C2F896-85F1-1B76-1757-0BE95BD90BE1}"/>
+                  </a:ext>
+                </a:extLst>
+              </p:cNvPr>
+              <p:cNvPicPr>
+                <a:picLocks noChangeAspect="1"/>
+              </p:cNvPicPr>
+              <p:nvPr/>
+            </p:nvPicPr>
+            <p:blipFill rotWithShape="1">
+              <a:blip r:embed="rId13"/>
+              <a:srcRect l="-1020" t="53864" r="-1020"/>
+              <a:stretch/>
+            </p:blipFill>
+            <p:spPr>
+              <a:xfrm>
+                <a:off x="5948021" y="3009807"/>
+                <a:ext cx="914400" cy="674992"/>
+              </a:xfrm>
+              <a:prstGeom prst="rect">
+                <a:avLst/>
+              </a:prstGeom>
+            </p:spPr>
+          </p:pic>
+        </p:grpSp>
         <p:pic>
           <p:nvPicPr>
-            <p:cNvPr id="4" name="Picture 3">
+            <p:cNvPr id="23" name="Picture 22">
               <a:extLst>
                 <a:ext uri="{FF2B5EF4-FFF2-40B4-BE49-F238E27FC236}">
-                  <a16:creationId xmlns:a16="http://schemas.microsoft.com/office/drawing/2014/main" id="{D9E4C452-DF69-C9A0-5B52-EBE16BD0432D}"/>
+                  <a16:creationId xmlns:a16="http://schemas.microsoft.com/office/drawing/2014/main" id="{7AE49583-49D2-8978-1768-EA3367323ED1}"/>
                 </a:ext>
               </a:extLst>
             </p:cNvPr>
@@ -3593,7 +4015,7 @@
             <p:nvPr/>
           </p:nvPicPr>
           <p:blipFill>
-            <a:blip r:embed="rId9"/>
+            <a:blip r:embed="rId14"/>
             <a:stretch>
               <a:fillRect/>
             </a:stretch>
@@ -3602,6 +4024,35 @@
             <a:xfrm>
               <a:off x="109728" y="201168"/>
               <a:ext cx="1682496" cy="1682496"/>
+            </a:xfrm>
+            <a:prstGeom prst="rect">
+              <a:avLst/>
+            </a:prstGeom>
+          </p:spPr>
+        </p:pic>
+        <p:pic>
+          <p:nvPicPr>
+            <p:cNvPr id="19" name="Picture 18">
+              <a:extLst>
+                <a:ext uri="{FF2B5EF4-FFF2-40B4-BE49-F238E27FC236}">
+                  <a16:creationId xmlns:a16="http://schemas.microsoft.com/office/drawing/2014/main" id="{F1675111-76A9-C064-3779-45F4098EB825}"/>
+                </a:ext>
+              </a:extLst>
+            </p:cNvPr>
+            <p:cNvPicPr>
+              <a:picLocks noChangeAspect="1"/>
+            </p:cNvPicPr>
+            <p:nvPr/>
+          </p:nvPicPr>
+          <p:blipFill rotWithShape="1">
+            <a:blip r:embed="rId15"/>
+            <a:srcRect l="1689"/>
+            <a:stretch/>
+          </p:blipFill>
+          <p:spPr>
+            <a:xfrm>
+              <a:off x="1774924" y="1888036"/>
+              <a:ext cx="1654075" cy="1682496"/>
             </a:xfrm>
             <a:prstGeom prst="rect">
               <a:avLst/>
@@ -3622,7 +4073,7 @@
           </p:nvGrpSpPr>
           <p:grpSpPr>
             <a:xfrm>
-              <a:off x="406986" y="156662"/>
+              <a:off x="392509" y="171663"/>
               <a:ext cx="1167478" cy="732487"/>
               <a:chOff x="406986" y="156662"/>
               <a:chExt cx="1167478" cy="732487"/>
@@ -3643,7 +4094,7 @@
               <p:nvPr/>
             </p:nvPicPr>
             <p:blipFill>
-              <a:blip r:embed="rId10"/>
+              <a:blip r:embed="rId16"/>
               <a:stretch>
                 <a:fillRect/>
               </a:stretch>
@@ -3827,90 +4278,467 @@
             </p:cxnSp>
           </p:grpSp>
         </p:grpSp>
+        <p:grpSp>
+          <p:nvGrpSpPr>
+            <p:cNvPr id="9" name="Group 8">
+              <a:extLst>
+                <a:ext uri="{FF2B5EF4-FFF2-40B4-BE49-F238E27FC236}">
+                  <a16:creationId xmlns:a16="http://schemas.microsoft.com/office/drawing/2014/main" id="{98DD739D-4F23-8167-DC97-C0B6DBE9402F}"/>
+                </a:ext>
+              </a:extLst>
+            </p:cNvPr>
+            <p:cNvGrpSpPr/>
+            <p:nvPr/>
+          </p:nvGrpSpPr>
+          <p:grpSpPr>
+            <a:xfrm>
+              <a:off x="3408502" y="1875383"/>
+              <a:ext cx="2751026" cy="1682496"/>
+              <a:chOff x="3365192" y="1914395"/>
+              <a:chExt cx="2751026" cy="1682496"/>
+            </a:xfrm>
+          </p:grpSpPr>
+          <p:pic>
+            <p:nvPicPr>
+              <p:cNvPr id="24" name="Picture 23">
+                <a:extLst>
+                  <a:ext uri="{FF2B5EF4-FFF2-40B4-BE49-F238E27FC236}">
+                    <a16:creationId xmlns:a16="http://schemas.microsoft.com/office/drawing/2014/main" id="{07C6556B-41CC-216C-76F0-8BE0654811F5}"/>
+                  </a:ext>
+                </a:extLst>
+              </p:cNvPr>
+              <p:cNvPicPr>
+                <a:picLocks noChangeAspect="1"/>
+              </p:cNvPicPr>
+              <p:nvPr/>
+            </p:nvPicPr>
+            <p:blipFill>
+              <a:blip r:embed="rId17"/>
+              <a:stretch>
+                <a:fillRect/>
+              </a:stretch>
+            </p:blipFill>
+            <p:spPr>
+              <a:xfrm>
+                <a:off x="5092090" y="1992690"/>
+                <a:ext cx="1024128" cy="1024128"/>
+              </a:xfrm>
+              <a:prstGeom prst="rect">
+                <a:avLst/>
+              </a:prstGeom>
+            </p:spPr>
+          </p:pic>
+          <p:pic>
+            <p:nvPicPr>
+              <p:cNvPr id="22" name="Picture 21">
+                <a:extLst>
+                  <a:ext uri="{FF2B5EF4-FFF2-40B4-BE49-F238E27FC236}">
+                    <a16:creationId xmlns:a16="http://schemas.microsoft.com/office/drawing/2014/main" id="{AB08B937-2FF1-84E3-6F3F-737E2F038252}"/>
+                  </a:ext>
+                </a:extLst>
+              </p:cNvPr>
+              <p:cNvPicPr>
+                <a:picLocks noChangeAspect="1"/>
+              </p:cNvPicPr>
+              <p:nvPr/>
+            </p:nvPicPr>
+            <p:blipFill>
+              <a:blip r:embed="rId18"/>
+              <a:stretch>
+                <a:fillRect/>
+              </a:stretch>
+            </p:blipFill>
+            <p:spPr>
+              <a:xfrm>
+                <a:off x="3365192" y="1914395"/>
+                <a:ext cx="1682496" cy="1682496"/>
+              </a:xfrm>
+              <a:prstGeom prst="rect">
+                <a:avLst/>
+              </a:prstGeom>
+            </p:spPr>
+          </p:pic>
+          <p:grpSp>
+            <p:nvGrpSpPr>
+              <p:cNvPr id="2" name="Group 1">
+                <a:extLst>
+                  <a:ext uri="{FF2B5EF4-FFF2-40B4-BE49-F238E27FC236}">
+                    <a16:creationId xmlns:a16="http://schemas.microsoft.com/office/drawing/2014/main" id="{674730A2-7908-4BD1-06E3-488C1170626B}"/>
+                  </a:ext>
+                </a:extLst>
+              </p:cNvPr>
+              <p:cNvGrpSpPr/>
+              <p:nvPr/>
+            </p:nvGrpSpPr>
+            <p:grpSpPr>
+              <a:xfrm>
+                <a:off x="4762367" y="1966331"/>
+                <a:ext cx="465643" cy="965246"/>
+                <a:chOff x="5195499" y="1924907"/>
+                <a:chExt cx="465643" cy="965246"/>
+              </a:xfrm>
+            </p:grpSpPr>
+            <p:sp>
+              <p:nvSpPr>
+                <p:cNvPr id="41" name="Rectángulo 40">
+                  <a:extLst>
+                    <a:ext uri="{FF2B5EF4-FFF2-40B4-BE49-F238E27FC236}">
+                      <a16:creationId xmlns:a16="http://schemas.microsoft.com/office/drawing/2014/main" id="{8F51DEDB-4037-F544-AA8B-7AD937F6B7D9}"/>
+                    </a:ext>
+                  </a:extLst>
+                </p:cNvPr>
+                <p:cNvSpPr/>
+                <p:nvPr/>
+              </p:nvSpPr>
+              <p:spPr>
+                <a:xfrm>
+                  <a:off x="5195499" y="2018621"/>
+                  <a:ext cx="233700" cy="233700"/>
+                </a:xfrm>
+                <a:prstGeom prst="rect">
+                  <a:avLst/>
+                </a:prstGeom>
+                <a:noFill/>
+                <a:ln w="3175">
+                  <a:solidFill>
+                    <a:schemeClr val="tx1">
+                      <a:lumMod val="85000"/>
+                      <a:lumOff val="15000"/>
+                    </a:schemeClr>
+                  </a:solidFill>
+                </a:ln>
+              </p:spPr>
+              <p:style>
+                <a:lnRef idx="2">
+                  <a:schemeClr val="accent1">
+                    <a:shade val="50000"/>
+                  </a:schemeClr>
+                </a:lnRef>
+                <a:fillRef idx="1">
+                  <a:schemeClr val="accent1"/>
+                </a:fillRef>
+                <a:effectRef idx="0">
+                  <a:schemeClr val="accent1"/>
+                </a:effectRef>
+                <a:fontRef idx="minor">
+                  <a:schemeClr val="lt1"/>
+                </a:fontRef>
+              </p:style>
+              <p:txBody>
+                <a:bodyPr rtlCol="0" anchor="ctr"/>
+                <a:lstStyle/>
+                <a:p>
+                  <a:pPr algn="ctr"/>
+                  <a:endParaRPr lang="es-ES_tradnl"/>
+                </a:p>
+              </p:txBody>
+            </p:sp>
+            <p:cxnSp>
+              <p:nvCxnSpPr>
+                <p:cNvPr id="42" name="Conector recto de flecha 41">
+                  <a:extLst>
+                    <a:ext uri="{FF2B5EF4-FFF2-40B4-BE49-F238E27FC236}">
+                      <a16:creationId xmlns:a16="http://schemas.microsoft.com/office/drawing/2014/main" id="{07A85A92-09FF-B740-85CE-84B5641C460A}"/>
+                    </a:ext>
+                  </a:extLst>
+                </p:cNvPr>
+                <p:cNvCxnSpPr>
+                  <a:cxnSpLocks/>
+                </p:cNvCxnSpPr>
+                <p:nvPr/>
+              </p:nvCxnSpPr>
+              <p:spPr>
+                <a:xfrm>
+                  <a:off x="5433353" y="2252321"/>
+                  <a:ext cx="79217" cy="637832"/>
+                </a:xfrm>
+                <a:prstGeom prst="straightConnector1">
+                  <a:avLst/>
+                </a:prstGeom>
+                <a:ln w="3175">
+                  <a:solidFill>
+                    <a:schemeClr val="tx1">
+                      <a:lumMod val="85000"/>
+                      <a:lumOff val="15000"/>
+                    </a:schemeClr>
+                  </a:solidFill>
+                </a:ln>
+              </p:spPr>
+              <p:style>
+                <a:lnRef idx="1">
+                  <a:schemeClr val="accent1"/>
+                </a:lnRef>
+                <a:fillRef idx="0">
+                  <a:schemeClr val="accent1"/>
+                </a:fillRef>
+                <a:effectRef idx="0">
+                  <a:schemeClr val="accent1"/>
+                </a:effectRef>
+                <a:fontRef idx="minor">
+                  <a:schemeClr val="tx1"/>
+                </a:fontRef>
+              </p:style>
+            </p:cxnSp>
+            <p:cxnSp>
+              <p:nvCxnSpPr>
+                <p:cNvPr id="117" name="Conector recto de flecha 116">
+                  <a:extLst>
+                    <a:ext uri="{FF2B5EF4-FFF2-40B4-BE49-F238E27FC236}">
+                      <a16:creationId xmlns:a16="http://schemas.microsoft.com/office/drawing/2014/main" id="{76CFBA79-6EAE-BC45-9844-16FE00137435}"/>
+                    </a:ext>
+                  </a:extLst>
+                </p:cNvPr>
+                <p:cNvCxnSpPr>
+                  <a:cxnSpLocks/>
+                </p:cNvCxnSpPr>
+                <p:nvPr/>
+              </p:nvCxnSpPr>
+              <p:spPr>
+                <a:xfrm flipV="1">
+                  <a:off x="5427003" y="1924907"/>
+                  <a:ext cx="94065" cy="96238"/>
+                </a:xfrm>
+                <a:prstGeom prst="straightConnector1">
+                  <a:avLst/>
+                </a:prstGeom>
+                <a:ln w="3175">
+                  <a:solidFill>
+                    <a:schemeClr val="tx1">
+                      <a:lumMod val="85000"/>
+                      <a:lumOff val="15000"/>
+                    </a:schemeClr>
+                  </a:solidFill>
+                </a:ln>
+              </p:spPr>
+              <p:style>
+                <a:lnRef idx="1">
+                  <a:schemeClr val="accent1"/>
+                </a:lnRef>
+                <a:fillRef idx="0">
+                  <a:schemeClr val="accent1"/>
+                </a:fillRef>
+                <a:effectRef idx="0">
+                  <a:schemeClr val="accent1"/>
+                </a:effectRef>
+                <a:fontRef idx="minor">
+                  <a:schemeClr val="tx1"/>
+                </a:fontRef>
+              </p:style>
+            </p:cxnSp>
+            <p:cxnSp>
+              <p:nvCxnSpPr>
+                <p:cNvPr id="121" name="Conector recto de flecha 120">
+                  <a:extLst>
+                    <a:ext uri="{FF2B5EF4-FFF2-40B4-BE49-F238E27FC236}">
+                      <a16:creationId xmlns:a16="http://schemas.microsoft.com/office/drawing/2014/main" id="{B5B9E5BF-3A70-1840-BF9A-99319FA40B3B}"/>
+                    </a:ext>
+                  </a:extLst>
+                </p:cNvPr>
+                <p:cNvCxnSpPr>
+                  <a:cxnSpLocks/>
+                </p:cNvCxnSpPr>
+                <p:nvPr/>
+              </p:nvCxnSpPr>
+              <p:spPr>
+                <a:xfrm>
+                  <a:off x="5521507" y="1924907"/>
+                  <a:ext cx="139635" cy="0"/>
+                </a:xfrm>
+                <a:prstGeom prst="straightConnector1">
+                  <a:avLst/>
+                </a:prstGeom>
+                <a:ln w="3175">
+                  <a:solidFill>
+                    <a:schemeClr val="tx1">
+                      <a:lumMod val="85000"/>
+                      <a:lumOff val="15000"/>
+                    </a:schemeClr>
+                  </a:solidFill>
+                </a:ln>
+              </p:spPr>
+              <p:style>
+                <a:lnRef idx="1">
+                  <a:schemeClr val="accent1"/>
+                </a:lnRef>
+                <a:fillRef idx="0">
+                  <a:schemeClr val="accent1"/>
+                </a:fillRef>
+                <a:effectRef idx="0">
+                  <a:schemeClr val="accent1"/>
+                </a:effectRef>
+                <a:fontRef idx="minor">
+                  <a:schemeClr val="tx1"/>
+                </a:fontRef>
+              </p:style>
+            </p:cxnSp>
+            <p:cxnSp>
+              <p:nvCxnSpPr>
+                <p:cNvPr id="124" name="Conector recto de flecha 123">
+                  <a:extLst>
+                    <a:ext uri="{FF2B5EF4-FFF2-40B4-BE49-F238E27FC236}">
+                      <a16:creationId xmlns:a16="http://schemas.microsoft.com/office/drawing/2014/main" id="{A2D665F5-7432-F746-89C1-6FF63F53B2CF}"/>
+                    </a:ext>
+                  </a:extLst>
+                </p:cNvPr>
+                <p:cNvCxnSpPr>
+                  <a:cxnSpLocks/>
+                </p:cNvCxnSpPr>
+                <p:nvPr/>
+              </p:nvCxnSpPr>
+              <p:spPr>
+                <a:xfrm>
+                  <a:off x="5512570" y="2890153"/>
+                  <a:ext cx="139635" cy="0"/>
+                </a:xfrm>
+                <a:prstGeom prst="straightConnector1">
+                  <a:avLst/>
+                </a:prstGeom>
+                <a:ln w="3175">
+                  <a:solidFill>
+                    <a:schemeClr val="tx1">
+                      <a:lumMod val="85000"/>
+                      <a:lumOff val="15000"/>
+                    </a:schemeClr>
+                  </a:solidFill>
+                </a:ln>
+              </p:spPr>
+              <p:style>
+                <a:lnRef idx="1">
+                  <a:schemeClr val="accent1"/>
+                </a:lnRef>
+                <a:fillRef idx="0">
+                  <a:schemeClr val="accent1"/>
+                </a:fillRef>
+                <a:effectRef idx="0">
+                  <a:schemeClr val="accent1"/>
+                </a:effectRef>
+                <a:fontRef idx="minor">
+                  <a:schemeClr val="tx1"/>
+                </a:fontRef>
+              </p:style>
+            </p:cxnSp>
+          </p:grpSp>
+        </p:grpSp>
+        <p:pic>
+          <p:nvPicPr>
+            <p:cNvPr id="10" name="Picture 9">
+              <a:extLst>
+                <a:ext uri="{FF2B5EF4-FFF2-40B4-BE49-F238E27FC236}">
+                  <a16:creationId xmlns:a16="http://schemas.microsoft.com/office/drawing/2014/main" id="{EFF9DD20-6889-6A33-44D8-2BA45A177EE6}"/>
+                </a:ext>
+              </a:extLst>
+            </p:cNvPr>
+            <p:cNvPicPr>
+              <a:picLocks noChangeAspect="1"/>
+            </p:cNvPicPr>
+            <p:nvPr/>
+          </p:nvPicPr>
+          <p:blipFill>
+            <a:blip r:embed="rId19"/>
+            <a:stretch>
+              <a:fillRect/>
+            </a:stretch>
+          </p:blipFill>
+          <p:spPr>
+            <a:xfrm>
+              <a:off x="1746504" y="201168"/>
+              <a:ext cx="1682496" cy="1682496"/>
+            </a:xfrm>
+            <a:prstGeom prst="rect">
+              <a:avLst/>
+            </a:prstGeom>
+          </p:spPr>
+        </p:pic>
+        <p:pic>
+          <p:nvPicPr>
+            <p:cNvPr id="12" name="Picture 11">
+              <a:extLst>
+                <a:ext uri="{FF2B5EF4-FFF2-40B4-BE49-F238E27FC236}">
+                  <a16:creationId xmlns:a16="http://schemas.microsoft.com/office/drawing/2014/main" id="{2632B13B-8364-60E1-510C-192E385C9D6D}"/>
+                </a:ext>
+              </a:extLst>
+            </p:cNvPr>
+            <p:cNvPicPr>
+              <a:picLocks noChangeAspect="1"/>
+            </p:cNvPicPr>
+            <p:nvPr/>
+          </p:nvPicPr>
+          <p:blipFill>
+            <a:blip r:embed="rId20"/>
+            <a:stretch>
+              <a:fillRect/>
+            </a:stretch>
+          </p:blipFill>
+          <p:spPr>
+            <a:xfrm>
+              <a:off x="3448750" y="206347"/>
+              <a:ext cx="1682496" cy="1682496"/>
+            </a:xfrm>
+            <a:prstGeom prst="rect">
+              <a:avLst/>
+            </a:prstGeom>
+          </p:spPr>
+        </p:pic>
+        <p:pic>
+          <p:nvPicPr>
+            <p:cNvPr id="15" name="Picture 14">
+              <a:extLst>
+                <a:ext uri="{FF2B5EF4-FFF2-40B4-BE49-F238E27FC236}">
+                  <a16:creationId xmlns:a16="http://schemas.microsoft.com/office/drawing/2014/main" id="{23986EC8-43F3-D5B9-2861-45D5620DA4CC}"/>
+                </a:ext>
+              </a:extLst>
+            </p:cNvPr>
+            <p:cNvPicPr>
+              <a:picLocks noChangeAspect="1"/>
+            </p:cNvPicPr>
+            <p:nvPr/>
+          </p:nvPicPr>
+          <p:blipFill>
+            <a:blip r:embed="rId21"/>
+            <a:stretch>
+              <a:fillRect/>
+            </a:stretch>
+          </p:blipFill>
+          <p:spPr>
+            <a:xfrm>
+              <a:off x="5065776" y="206347"/>
+              <a:ext cx="1682496" cy="1682496"/>
+            </a:xfrm>
+            <a:prstGeom prst="rect">
+              <a:avLst/>
+            </a:prstGeom>
+          </p:spPr>
+        </p:pic>
+        <p:pic>
+          <p:nvPicPr>
+            <p:cNvPr id="17" name="Picture 16">
+              <a:extLst>
+                <a:ext uri="{FF2B5EF4-FFF2-40B4-BE49-F238E27FC236}">
+                  <a16:creationId xmlns:a16="http://schemas.microsoft.com/office/drawing/2014/main" id="{9ACDA16C-D145-B631-9097-64D1050F0D75}"/>
+                </a:ext>
+              </a:extLst>
+            </p:cNvPr>
+            <p:cNvPicPr>
+              <a:picLocks noChangeAspect="1"/>
+            </p:cNvPicPr>
+            <p:nvPr/>
+          </p:nvPicPr>
+          <p:blipFill rotWithShape="1">
+            <a:blip r:embed="rId22"/>
+            <a:srcRect r="1762"/>
+            <a:stretch/>
+          </p:blipFill>
+          <p:spPr>
+            <a:xfrm>
+              <a:off x="109728" y="1883664"/>
+              <a:ext cx="1652854" cy="1682496"/>
+            </a:xfrm>
+            <a:prstGeom prst="rect">
+              <a:avLst/>
+            </a:prstGeom>
+          </p:spPr>
+        </p:pic>
       </p:grpSp>
-      <p:sp>
-        <p:nvSpPr>
-          <p:cNvPr id="130" name="矩形 129"/>
-          <p:cNvSpPr/>
-          <p:nvPr/>
-        </p:nvSpPr>
-        <p:spPr>
-          <a:xfrm>
-            <a:off x="26793" y="9209855"/>
-            <a:ext cx="6831207" cy="707886"/>
-          </a:xfrm>
-          <a:prstGeom prst="rect">
-            <a:avLst/>
-          </a:prstGeom>
-        </p:spPr>
-        <p:txBody>
-          <a:bodyPr wrap="square">
-            <a:spAutoFit/>
-          </a:bodyPr>
-          <a:lstStyle/>
-          <a:p>
-            <a:r>
-              <a:rPr lang="en-US" altLang="zh-CN" sz="800" b="1">
-                <a:solidFill>
-                  <a:srgbClr val="C00000"/>
-                </a:solidFill>
-                <a:latin typeface="Arial" pitchFamily="34" charset="0"/>
-                <a:cs typeface="Arial" pitchFamily="34" charset="0"/>
-              </a:rPr>
-              <a:t>Figure 2:</a:t>
-            </a:r>
-            <a:r>
-              <a:rPr lang="en-US" altLang="zh-CN" sz="800" b="1">
-                <a:latin typeface="Arial" pitchFamily="34" charset="0"/>
-                <a:cs typeface="Arial" pitchFamily="34" charset="0"/>
-              </a:rPr>
-              <a:t> </a:t>
-            </a:r>
-            <a:r>
-              <a:rPr lang="en-US" altLang="zh-CN" sz="800" b="1" dirty="0">
-                <a:latin typeface="Arial" pitchFamily="34" charset="0"/>
-                <a:cs typeface="Arial" pitchFamily="34" charset="0"/>
-              </a:rPr>
-              <a:t>Overview of evaluation for Challenge 1: transcript identification with a reference annotation. a) </a:t>
-            </a:r>
-            <a:r>
-              <a:rPr lang="en-US" altLang="zh-CN" sz="800" dirty="0">
-                <a:latin typeface="Arial" pitchFamily="34" charset="0"/>
-                <a:cs typeface="Arial" pitchFamily="34" charset="0"/>
-              </a:rPr>
-              <a:t>Number of genes and transcripts per submission. Abundance of the main structural categories and support by external data. b) Agreement in transcript detection as a function the number of detecting pipelines. c) Performance based on for spliced-short and </a:t>
-            </a:r>
-            <a:r>
-              <a:rPr lang="en-US" altLang="zh-CN" sz="800" dirty="0" err="1">
-                <a:latin typeface="Arial" pitchFamily="34" charset="0"/>
-                <a:cs typeface="Arial" pitchFamily="34" charset="0"/>
-              </a:rPr>
-              <a:t>unspliced</a:t>
-            </a:r>
-            <a:r>
-              <a:rPr lang="en-US" altLang="zh-CN" sz="800" dirty="0">
-                <a:latin typeface="Arial" pitchFamily="34" charset="0"/>
-                <a:cs typeface="Arial" pitchFamily="34" charset="0"/>
-              </a:rPr>
-              <a:t>-long SIRVs. d) Performance based on simulated data. e) Performance for known and novel transcripts based on  50 manually-annotated genes by GENCODE. Ba: Bambu, FM: Flames, FR: FLAIR, IQ: IsoQuant, IT: IsoTools, IB: Iso_IB, Ly: LyRic, Ma: Mandalorion, TL: TALON-LAPA, </a:t>
-            </a:r>
-            <a:r>
-              <a:rPr lang="en-US" altLang="zh-CN" sz="800" dirty="0" err="1">
-                <a:latin typeface="Arial" pitchFamily="34" charset="0"/>
-                <a:cs typeface="Arial" pitchFamily="34" charset="0"/>
-              </a:rPr>
-              <a:t>Sp</a:t>
-            </a:r>
-            <a:r>
-              <a:rPr lang="en-US" altLang="zh-CN" sz="800" dirty="0">
-                <a:latin typeface="Arial" pitchFamily="34" charset="0"/>
-                <a:cs typeface="Arial" pitchFamily="34" charset="0"/>
-              </a:rPr>
-              <a:t>: Spectra, ST: StringTie2.</a:t>
-            </a:r>
-          </a:p>
-        </p:txBody>
-      </p:sp>
       <p:sp>
         <p:nvSpPr>
           <p:cNvPr id="97" name="TextBox 180">
@@ -3953,815 +4781,6 @@
           </a:p>
         </p:txBody>
       </p:sp>
-      <p:sp>
-        <p:nvSpPr>
-          <p:cNvPr id="41" name="Rectángulo 40">
-            <a:extLst>
-              <a:ext uri="{FF2B5EF4-FFF2-40B4-BE49-F238E27FC236}">
-                <a16:creationId xmlns:a16="http://schemas.microsoft.com/office/drawing/2014/main" id="{8F51DEDB-4037-F544-AA8B-7AD937F6B7D9}"/>
-              </a:ext>
-            </a:extLst>
-          </p:cNvPr>
-          <p:cNvSpPr/>
-          <p:nvPr/>
-        </p:nvSpPr>
-        <p:spPr>
-          <a:xfrm>
-            <a:off x="5195499" y="2018621"/>
-            <a:ext cx="233700" cy="233700"/>
-          </a:xfrm>
-          <a:prstGeom prst="rect">
-            <a:avLst/>
-          </a:prstGeom>
-          <a:noFill/>
-          <a:ln w="3175">
-            <a:solidFill>
-              <a:schemeClr val="tx1">
-                <a:lumMod val="85000"/>
-                <a:lumOff val="15000"/>
-              </a:schemeClr>
-            </a:solidFill>
-          </a:ln>
-        </p:spPr>
-        <p:style>
-          <a:lnRef idx="2">
-            <a:schemeClr val="accent1">
-              <a:shade val="50000"/>
-            </a:schemeClr>
-          </a:lnRef>
-          <a:fillRef idx="1">
-            <a:schemeClr val="accent1"/>
-          </a:fillRef>
-          <a:effectRef idx="0">
-            <a:schemeClr val="accent1"/>
-          </a:effectRef>
-          <a:fontRef idx="minor">
-            <a:schemeClr val="lt1"/>
-          </a:fontRef>
-        </p:style>
-        <p:txBody>
-          <a:bodyPr rtlCol="0" anchor="ctr"/>
-          <a:lstStyle/>
-          <a:p>
-            <a:pPr algn="ctr"/>
-            <a:endParaRPr lang="es-ES_tradnl"/>
-          </a:p>
-        </p:txBody>
-      </p:sp>
-      <p:cxnSp>
-        <p:nvCxnSpPr>
-          <p:cNvPr id="42" name="Conector recto de flecha 41">
-            <a:extLst>
-              <a:ext uri="{FF2B5EF4-FFF2-40B4-BE49-F238E27FC236}">
-                <a16:creationId xmlns:a16="http://schemas.microsoft.com/office/drawing/2014/main" id="{07A85A92-09FF-B740-85CE-84B5641C460A}"/>
-              </a:ext>
-            </a:extLst>
-          </p:cNvPr>
-          <p:cNvCxnSpPr>
-            <a:cxnSpLocks/>
-          </p:cNvCxnSpPr>
-          <p:nvPr/>
-        </p:nvCxnSpPr>
-        <p:spPr>
-          <a:xfrm>
-            <a:off x="5433353" y="2252321"/>
-            <a:ext cx="79217" cy="637832"/>
-          </a:xfrm>
-          <a:prstGeom prst="straightConnector1">
-            <a:avLst/>
-          </a:prstGeom>
-          <a:ln w="3175">
-            <a:solidFill>
-              <a:schemeClr val="tx1">
-                <a:lumMod val="85000"/>
-                <a:lumOff val="15000"/>
-              </a:schemeClr>
-            </a:solidFill>
-          </a:ln>
-        </p:spPr>
-        <p:style>
-          <a:lnRef idx="1">
-            <a:schemeClr val="accent1"/>
-          </a:lnRef>
-          <a:fillRef idx="0">
-            <a:schemeClr val="accent1"/>
-          </a:fillRef>
-          <a:effectRef idx="0">
-            <a:schemeClr val="accent1"/>
-          </a:effectRef>
-          <a:fontRef idx="minor">
-            <a:schemeClr val="tx1"/>
-          </a:fontRef>
-        </p:style>
-      </p:cxnSp>
-      <p:cxnSp>
-        <p:nvCxnSpPr>
-          <p:cNvPr id="117" name="Conector recto de flecha 116">
-            <a:extLst>
-              <a:ext uri="{FF2B5EF4-FFF2-40B4-BE49-F238E27FC236}">
-                <a16:creationId xmlns:a16="http://schemas.microsoft.com/office/drawing/2014/main" id="{76CFBA79-6EAE-BC45-9844-16FE00137435}"/>
-              </a:ext>
-            </a:extLst>
-          </p:cNvPr>
-          <p:cNvCxnSpPr>
-            <a:cxnSpLocks/>
-          </p:cNvCxnSpPr>
-          <p:nvPr/>
-        </p:nvCxnSpPr>
-        <p:spPr>
-          <a:xfrm flipV="1">
-            <a:off x="5427003" y="1924907"/>
-            <a:ext cx="94065" cy="96238"/>
-          </a:xfrm>
-          <a:prstGeom prst="straightConnector1">
-            <a:avLst/>
-          </a:prstGeom>
-          <a:ln w="3175">
-            <a:solidFill>
-              <a:schemeClr val="tx1">
-                <a:lumMod val="85000"/>
-                <a:lumOff val="15000"/>
-              </a:schemeClr>
-            </a:solidFill>
-          </a:ln>
-        </p:spPr>
-        <p:style>
-          <a:lnRef idx="1">
-            <a:schemeClr val="accent1"/>
-          </a:lnRef>
-          <a:fillRef idx="0">
-            <a:schemeClr val="accent1"/>
-          </a:fillRef>
-          <a:effectRef idx="0">
-            <a:schemeClr val="accent1"/>
-          </a:effectRef>
-          <a:fontRef idx="minor">
-            <a:schemeClr val="tx1"/>
-          </a:fontRef>
-        </p:style>
-      </p:cxnSp>
-      <p:cxnSp>
-        <p:nvCxnSpPr>
-          <p:cNvPr id="121" name="Conector recto de flecha 120">
-            <a:extLst>
-              <a:ext uri="{FF2B5EF4-FFF2-40B4-BE49-F238E27FC236}">
-                <a16:creationId xmlns:a16="http://schemas.microsoft.com/office/drawing/2014/main" id="{B5B9E5BF-3A70-1840-BF9A-99319FA40B3B}"/>
-              </a:ext>
-            </a:extLst>
-          </p:cNvPr>
-          <p:cNvCxnSpPr>
-            <a:cxnSpLocks/>
-          </p:cNvCxnSpPr>
-          <p:nvPr/>
-        </p:nvCxnSpPr>
-        <p:spPr>
-          <a:xfrm>
-            <a:off x="5521507" y="1924907"/>
-            <a:ext cx="139635" cy="0"/>
-          </a:xfrm>
-          <a:prstGeom prst="straightConnector1">
-            <a:avLst/>
-          </a:prstGeom>
-          <a:ln w="3175">
-            <a:solidFill>
-              <a:schemeClr val="tx1">
-                <a:lumMod val="85000"/>
-                <a:lumOff val="15000"/>
-              </a:schemeClr>
-            </a:solidFill>
-          </a:ln>
-        </p:spPr>
-        <p:style>
-          <a:lnRef idx="1">
-            <a:schemeClr val="accent1"/>
-          </a:lnRef>
-          <a:fillRef idx="0">
-            <a:schemeClr val="accent1"/>
-          </a:fillRef>
-          <a:effectRef idx="0">
-            <a:schemeClr val="accent1"/>
-          </a:effectRef>
-          <a:fontRef idx="minor">
-            <a:schemeClr val="tx1"/>
-          </a:fontRef>
-        </p:style>
-      </p:cxnSp>
-      <p:cxnSp>
-        <p:nvCxnSpPr>
-          <p:cNvPr id="124" name="Conector recto de flecha 123">
-            <a:extLst>
-              <a:ext uri="{FF2B5EF4-FFF2-40B4-BE49-F238E27FC236}">
-                <a16:creationId xmlns:a16="http://schemas.microsoft.com/office/drawing/2014/main" id="{A2D665F5-7432-F746-89C1-6FF63F53B2CF}"/>
-              </a:ext>
-            </a:extLst>
-          </p:cNvPr>
-          <p:cNvCxnSpPr>
-            <a:cxnSpLocks/>
-          </p:cNvCxnSpPr>
-          <p:nvPr/>
-        </p:nvCxnSpPr>
-        <p:spPr>
-          <a:xfrm>
-            <a:off x="5512570" y="2890153"/>
-            <a:ext cx="139635" cy="0"/>
-          </a:xfrm>
-          <a:prstGeom prst="straightConnector1">
-            <a:avLst/>
-          </a:prstGeom>
-          <a:ln w="3175">
-            <a:solidFill>
-              <a:schemeClr val="tx1">
-                <a:lumMod val="85000"/>
-                <a:lumOff val="15000"/>
-              </a:schemeClr>
-            </a:solidFill>
-          </a:ln>
-        </p:spPr>
-        <p:style>
-          <a:lnRef idx="1">
-            <a:schemeClr val="accent1"/>
-          </a:lnRef>
-          <a:fillRef idx="0">
-            <a:schemeClr val="accent1"/>
-          </a:fillRef>
-          <a:effectRef idx="0">
-            <a:schemeClr val="accent1"/>
-          </a:effectRef>
-          <a:fontRef idx="minor">
-            <a:schemeClr val="tx1"/>
-          </a:fontRef>
-        </p:style>
-      </p:cxnSp>
-      <p:sp>
-        <p:nvSpPr>
-          <p:cNvPr id="141" name="TextBox 180">
-            <a:extLst>
-              <a:ext uri="{FF2B5EF4-FFF2-40B4-BE49-F238E27FC236}">
-                <a16:creationId xmlns:a16="http://schemas.microsoft.com/office/drawing/2014/main" id="{D81EE273-87D2-6248-9C05-C2AC7A38C86F}"/>
-              </a:ext>
-            </a:extLst>
-          </p:cNvPr>
-          <p:cNvSpPr txBox="1"/>
-          <p:nvPr/>
-        </p:nvSpPr>
-        <p:spPr>
-          <a:xfrm>
-            <a:off x="61611" y="4914844"/>
-            <a:ext cx="207640" cy="215444"/>
-          </a:xfrm>
-          <a:prstGeom prst="rect">
-            <a:avLst/>
-          </a:prstGeom>
-          <a:noFill/>
-        </p:spPr>
-        <p:txBody>
-          <a:bodyPr wrap="square" lIns="0" tIns="0" rIns="0" bIns="0" rtlCol="0">
-            <a:spAutoFit/>
-          </a:bodyPr>
-          <a:lstStyle/>
-          <a:p>
-            <a:r>
-              <a:rPr lang="en-US" sz="1400" b="1" dirty="0">
-                <a:latin typeface="Arial" pitchFamily="34" charset="0"/>
-                <a:cs typeface="Arial" pitchFamily="34" charset="0"/>
-              </a:rPr>
-              <a:t>d</a:t>
-            </a:r>
-            <a:endParaRPr lang="x-none" sz="1400" b="1" dirty="0">
-              <a:latin typeface="Arial" pitchFamily="34" charset="0"/>
-              <a:cs typeface="Arial" pitchFamily="34" charset="0"/>
-            </a:endParaRPr>
-          </a:p>
-        </p:txBody>
-      </p:sp>
-      <p:sp>
-        <p:nvSpPr>
-          <p:cNvPr id="98" name="TextBox 180">
-            <a:extLst>
-              <a:ext uri="{FF2B5EF4-FFF2-40B4-BE49-F238E27FC236}">
-                <a16:creationId xmlns:a16="http://schemas.microsoft.com/office/drawing/2014/main" id="{ACF6B259-DD77-1F49-A63F-7D4D37EE33F1}"/>
-              </a:ext>
-            </a:extLst>
-          </p:cNvPr>
-          <p:cNvSpPr txBox="1"/>
-          <p:nvPr/>
-        </p:nvSpPr>
-        <p:spPr>
-          <a:xfrm>
-            <a:off x="61611" y="3571836"/>
-            <a:ext cx="122258" cy="215444"/>
-          </a:xfrm>
-          <a:prstGeom prst="rect">
-            <a:avLst/>
-          </a:prstGeom>
-          <a:noFill/>
-        </p:spPr>
-        <p:txBody>
-          <a:bodyPr wrap="square" lIns="0" tIns="0" rIns="0" bIns="0" rtlCol="0">
-            <a:spAutoFit/>
-          </a:bodyPr>
-          <a:lstStyle/>
-          <a:p>
-            <a:r>
-              <a:rPr lang="en-US" sz="1400" b="1" dirty="0">
-                <a:latin typeface="Arial" pitchFamily="34" charset="0"/>
-                <a:cs typeface="Arial" pitchFamily="34" charset="0"/>
-              </a:rPr>
-              <a:t>b</a:t>
-            </a:r>
-            <a:endParaRPr lang="x-none" sz="1400" b="1" dirty="0">
-              <a:latin typeface="Arial" pitchFamily="34" charset="0"/>
-              <a:cs typeface="Arial" pitchFamily="34" charset="0"/>
-            </a:endParaRPr>
-          </a:p>
-        </p:txBody>
-      </p:sp>
-      <p:pic>
-        <p:nvPicPr>
-          <p:cNvPr id="80" name="Gráfico 79">
-            <a:extLst>
-              <a:ext uri="{FF2B5EF4-FFF2-40B4-BE49-F238E27FC236}">
-                <a16:creationId xmlns:a16="http://schemas.microsoft.com/office/drawing/2014/main" id="{406107A0-8EAD-2F41-A9B7-D87D4647806A}"/>
-              </a:ext>
-            </a:extLst>
-          </p:cNvPr>
-          <p:cNvPicPr>
-            <a:picLocks noChangeAspect="1"/>
-          </p:cNvPicPr>
-          <p:nvPr/>
-        </p:nvPicPr>
-        <p:blipFill rotWithShape="1">
-          <a:blip r:embed="rId11">
-            <a:extLst>
-              <a:ext uri="{96DAC541-7B7A-43D3-8B79-37D633B846F1}">
-                <asvg:svgBlip xmlns:asvg="http://schemas.microsoft.com/office/drawing/2016/SVG/main" r:embed="rId12"/>
-              </a:ext>
-            </a:extLst>
-          </a:blip>
-          <a:srcRect l="8078" t="46581" b="42876"/>
-          <a:stretch/>
-        </p:blipFill>
-        <p:spPr>
-          <a:xfrm>
-            <a:off x="250716" y="6603306"/>
-            <a:ext cx="2978269" cy="170794"/>
-          </a:xfrm>
-          <a:prstGeom prst="rect">
-            <a:avLst/>
-          </a:prstGeom>
-        </p:spPr>
-      </p:pic>
-      <p:sp>
-        <p:nvSpPr>
-          <p:cNvPr id="115" name="TextBox 180">
-            <a:extLst>
-              <a:ext uri="{FF2B5EF4-FFF2-40B4-BE49-F238E27FC236}">
-                <a16:creationId xmlns:a16="http://schemas.microsoft.com/office/drawing/2014/main" id="{205C7F67-F245-EC47-9D99-A3BB306738FB}"/>
-              </a:ext>
-            </a:extLst>
-          </p:cNvPr>
-          <p:cNvSpPr txBox="1"/>
-          <p:nvPr/>
-        </p:nvSpPr>
-        <p:spPr>
-          <a:xfrm>
-            <a:off x="61611" y="6875441"/>
-            <a:ext cx="207640" cy="215444"/>
-          </a:xfrm>
-          <a:prstGeom prst="rect">
-            <a:avLst/>
-          </a:prstGeom>
-          <a:noFill/>
-        </p:spPr>
-        <p:txBody>
-          <a:bodyPr wrap="square" lIns="0" tIns="0" rIns="0" bIns="0" rtlCol="0">
-            <a:spAutoFit/>
-          </a:bodyPr>
-          <a:lstStyle/>
-          <a:p>
-            <a:r>
-              <a:rPr lang="en-US" sz="1400" b="1" dirty="0">
-                <a:latin typeface="Arial" pitchFamily="34" charset="0"/>
-                <a:cs typeface="Arial" pitchFamily="34" charset="0"/>
-              </a:rPr>
-              <a:t>e</a:t>
-            </a:r>
-            <a:endParaRPr lang="x-none" sz="1400" b="1" dirty="0">
-              <a:latin typeface="Arial" pitchFamily="34" charset="0"/>
-              <a:cs typeface="Arial" pitchFamily="34" charset="0"/>
-            </a:endParaRPr>
-          </a:p>
-        </p:txBody>
-      </p:sp>
-      <p:pic>
-        <p:nvPicPr>
-          <p:cNvPr id="14" name="Picture 13">
-            <a:extLst>
-              <a:ext uri="{FF2B5EF4-FFF2-40B4-BE49-F238E27FC236}">
-                <a16:creationId xmlns:a16="http://schemas.microsoft.com/office/drawing/2014/main" id="{BB1CE44E-7743-1D16-33DF-69EE1E93CD1B}"/>
-              </a:ext>
-            </a:extLst>
-          </p:cNvPr>
-          <p:cNvPicPr>
-            <a:picLocks noChangeAspect="1"/>
-          </p:cNvPicPr>
-          <p:nvPr/>
-        </p:nvPicPr>
-        <p:blipFill rotWithShape="1">
-          <a:blip r:embed="rId13"/>
-          <a:srcRect b="26859"/>
-          <a:stretch/>
-        </p:blipFill>
-        <p:spPr>
-          <a:xfrm>
-            <a:off x="384645" y="5062454"/>
-            <a:ext cx="2633338" cy="1540852"/>
-          </a:xfrm>
-          <a:prstGeom prst="rect">
-            <a:avLst/>
-          </a:prstGeom>
-        </p:spPr>
-      </p:pic>
-      <p:pic>
-        <p:nvPicPr>
-          <p:cNvPr id="20" name="Graphic 19">
-            <a:extLst>
-              <a:ext uri="{FF2B5EF4-FFF2-40B4-BE49-F238E27FC236}">
-                <a16:creationId xmlns:a16="http://schemas.microsoft.com/office/drawing/2014/main" id="{2B17FD3C-EDDE-B3BC-7118-AB90F6A12581}"/>
-              </a:ext>
-            </a:extLst>
-          </p:cNvPr>
-          <p:cNvPicPr>
-            <a:picLocks noChangeAspect="1"/>
-          </p:cNvPicPr>
-          <p:nvPr/>
-        </p:nvPicPr>
-        <p:blipFill>
-          <a:blip r:embed="rId14">
-            <a:extLst>
-              <a:ext uri="{96DAC541-7B7A-43D3-8B79-37D633B846F1}">
-                <asvg:svgBlip xmlns:asvg="http://schemas.microsoft.com/office/drawing/2016/SVG/main" r:embed="rId15"/>
-              </a:ext>
-            </a:extLst>
-          </a:blip>
-          <a:stretch>
-            <a:fillRect/>
-          </a:stretch>
-        </p:blipFill>
-        <p:spPr>
-          <a:xfrm>
-            <a:off x="330826" y="3576798"/>
-            <a:ext cx="2740976" cy="1370488"/>
-          </a:xfrm>
-          <a:prstGeom prst="rect">
-            <a:avLst/>
-          </a:prstGeom>
-        </p:spPr>
-      </p:pic>
-      <p:sp>
-        <p:nvSpPr>
-          <p:cNvPr id="140" name="TextBox 180">
-            <a:extLst>
-              <a:ext uri="{FF2B5EF4-FFF2-40B4-BE49-F238E27FC236}">
-                <a16:creationId xmlns:a16="http://schemas.microsoft.com/office/drawing/2014/main" id="{96028256-02F2-314F-9D9F-0DEB18CE39A0}"/>
-              </a:ext>
-            </a:extLst>
-          </p:cNvPr>
-          <p:cNvSpPr txBox="1"/>
-          <p:nvPr/>
-        </p:nvSpPr>
-        <p:spPr>
-          <a:xfrm>
-            <a:off x="3212733" y="3564145"/>
-            <a:ext cx="207640" cy="215444"/>
-          </a:xfrm>
-          <a:prstGeom prst="rect">
-            <a:avLst/>
-          </a:prstGeom>
-          <a:noFill/>
-        </p:spPr>
-        <p:txBody>
-          <a:bodyPr wrap="square" lIns="0" tIns="0" rIns="0" bIns="0" rtlCol="0">
-            <a:spAutoFit/>
-          </a:bodyPr>
-          <a:lstStyle/>
-          <a:p>
-            <a:r>
-              <a:rPr lang="en-US" sz="1400" b="1" dirty="0">
-                <a:latin typeface="Arial" pitchFamily="34" charset="0"/>
-                <a:cs typeface="Arial" pitchFamily="34" charset="0"/>
-              </a:rPr>
-              <a:t>c</a:t>
-            </a:r>
-            <a:endParaRPr lang="x-none" sz="1400" b="1" dirty="0">
-              <a:latin typeface="Arial" pitchFamily="34" charset="0"/>
-              <a:cs typeface="Arial" pitchFamily="34" charset="0"/>
-            </a:endParaRPr>
-          </a:p>
-        </p:txBody>
-      </p:sp>
-      <p:cxnSp>
-        <p:nvCxnSpPr>
-          <p:cNvPr id="29" name="Straight Connector 28">
-            <a:extLst>
-              <a:ext uri="{FF2B5EF4-FFF2-40B4-BE49-F238E27FC236}">
-                <a16:creationId xmlns:a16="http://schemas.microsoft.com/office/drawing/2014/main" id="{F3CBBC70-466C-0C59-C00C-7D8D51D320B5}"/>
-              </a:ext>
-            </a:extLst>
-          </p:cNvPr>
-          <p:cNvCxnSpPr>
-            <a:cxnSpLocks/>
-          </p:cNvCxnSpPr>
-          <p:nvPr/>
-        </p:nvCxnSpPr>
-        <p:spPr>
-          <a:xfrm>
-            <a:off x="3409357" y="3683930"/>
-            <a:ext cx="0" cy="3004773"/>
-          </a:xfrm>
-          <a:prstGeom prst="line">
-            <a:avLst/>
-          </a:prstGeom>
-          <a:ln w="15875">
-            <a:solidFill>
-              <a:schemeClr val="bg1"/>
-            </a:solidFill>
-          </a:ln>
-        </p:spPr>
-        <p:style>
-          <a:lnRef idx="1">
-            <a:schemeClr val="accent1"/>
-          </a:lnRef>
-          <a:fillRef idx="0">
-            <a:schemeClr val="accent1"/>
-          </a:fillRef>
-          <a:effectRef idx="0">
-            <a:schemeClr val="accent1"/>
-          </a:effectRef>
-          <a:fontRef idx="minor">
-            <a:schemeClr val="tx1"/>
-          </a:fontRef>
-        </p:style>
-      </p:cxnSp>
-      <p:pic>
-        <p:nvPicPr>
-          <p:cNvPr id="3" name="Picture 2">
-            <a:extLst>
-              <a:ext uri="{FF2B5EF4-FFF2-40B4-BE49-F238E27FC236}">
-                <a16:creationId xmlns:a16="http://schemas.microsoft.com/office/drawing/2014/main" id="{C0EAD4F0-942A-0372-FA87-AC0CC5750906}"/>
-              </a:ext>
-            </a:extLst>
-          </p:cNvPr>
-          <p:cNvPicPr>
-            <a:picLocks noChangeAspect="1"/>
-          </p:cNvPicPr>
-          <p:nvPr/>
-        </p:nvPicPr>
-        <p:blipFill>
-          <a:blip r:embed="rId16"/>
-          <a:stretch>
-            <a:fillRect/>
-          </a:stretch>
-        </p:blipFill>
-        <p:spPr>
-          <a:xfrm>
-            <a:off x="269251" y="6931747"/>
-            <a:ext cx="6345722" cy="2221003"/>
-          </a:xfrm>
-          <a:prstGeom prst="rect">
-            <a:avLst/>
-          </a:prstGeom>
-        </p:spPr>
-      </p:pic>
-      <p:pic>
-        <p:nvPicPr>
-          <p:cNvPr id="10" name="Picture 9">
-            <a:extLst>
-              <a:ext uri="{FF2B5EF4-FFF2-40B4-BE49-F238E27FC236}">
-                <a16:creationId xmlns:a16="http://schemas.microsoft.com/office/drawing/2014/main" id="{EFF9DD20-6889-6A33-44D8-2BA45A177EE6}"/>
-              </a:ext>
-            </a:extLst>
-          </p:cNvPr>
-          <p:cNvPicPr>
-            <a:picLocks noChangeAspect="1"/>
-          </p:cNvPicPr>
-          <p:nvPr/>
-        </p:nvPicPr>
-        <p:blipFill>
-          <a:blip r:embed="rId17"/>
-          <a:stretch>
-            <a:fillRect/>
-          </a:stretch>
-        </p:blipFill>
-        <p:spPr>
-          <a:xfrm>
-            <a:off x="1746504" y="201168"/>
-            <a:ext cx="1682496" cy="1682496"/>
-          </a:xfrm>
-          <a:prstGeom prst="rect">
-            <a:avLst/>
-          </a:prstGeom>
-        </p:spPr>
-      </p:pic>
-      <p:pic>
-        <p:nvPicPr>
-          <p:cNvPr id="12" name="Picture 11">
-            <a:extLst>
-              <a:ext uri="{FF2B5EF4-FFF2-40B4-BE49-F238E27FC236}">
-                <a16:creationId xmlns:a16="http://schemas.microsoft.com/office/drawing/2014/main" id="{2632B13B-8364-60E1-510C-192E385C9D6D}"/>
-              </a:ext>
-            </a:extLst>
-          </p:cNvPr>
-          <p:cNvPicPr>
-            <a:picLocks noChangeAspect="1"/>
-          </p:cNvPicPr>
-          <p:nvPr/>
-        </p:nvPicPr>
-        <p:blipFill>
-          <a:blip r:embed="rId18"/>
-          <a:stretch>
-            <a:fillRect/>
-          </a:stretch>
-        </p:blipFill>
-        <p:spPr>
-          <a:xfrm>
-            <a:off x="3392424" y="201168"/>
-            <a:ext cx="1682496" cy="1682496"/>
-          </a:xfrm>
-          <a:prstGeom prst="rect">
-            <a:avLst/>
-          </a:prstGeom>
-        </p:spPr>
-      </p:pic>
-      <p:pic>
-        <p:nvPicPr>
-          <p:cNvPr id="15" name="Picture 14">
-            <a:extLst>
-              <a:ext uri="{FF2B5EF4-FFF2-40B4-BE49-F238E27FC236}">
-                <a16:creationId xmlns:a16="http://schemas.microsoft.com/office/drawing/2014/main" id="{23986EC8-43F3-D5B9-2861-45D5620DA4CC}"/>
-              </a:ext>
-            </a:extLst>
-          </p:cNvPr>
-          <p:cNvPicPr>
-            <a:picLocks noChangeAspect="1"/>
-          </p:cNvPicPr>
-          <p:nvPr/>
-        </p:nvPicPr>
-        <p:blipFill>
-          <a:blip r:embed="rId19"/>
-          <a:stretch>
-            <a:fillRect/>
-          </a:stretch>
-        </p:blipFill>
-        <p:spPr>
-          <a:xfrm>
-            <a:off x="5029200" y="201168"/>
-            <a:ext cx="1682496" cy="1682496"/>
-          </a:xfrm>
-          <a:prstGeom prst="rect">
-            <a:avLst/>
-          </a:prstGeom>
-        </p:spPr>
-      </p:pic>
-      <p:pic>
-        <p:nvPicPr>
-          <p:cNvPr id="17" name="Picture 16">
-            <a:extLst>
-              <a:ext uri="{FF2B5EF4-FFF2-40B4-BE49-F238E27FC236}">
-                <a16:creationId xmlns:a16="http://schemas.microsoft.com/office/drawing/2014/main" id="{9ACDA16C-D145-B631-9097-64D1050F0D75}"/>
-              </a:ext>
-            </a:extLst>
-          </p:cNvPr>
-          <p:cNvPicPr>
-            <a:picLocks noChangeAspect="1"/>
-          </p:cNvPicPr>
-          <p:nvPr/>
-        </p:nvPicPr>
-        <p:blipFill>
-          <a:blip r:embed="rId20"/>
-          <a:stretch>
-            <a:fillRect/>
-          </a:stretch>
-        </p:blipFill>
-        <p:spPr>
-          <a:xfrm>
-            <a:off x="109728" y="1883664"/>
-            <a:ext cx="1682496" cy="1682496"/>
-          </a:xfrm>
-          <a:prstGeom prst="rect">
-            <a:avLst/>
-          </a:prstGeom>
-        </p:spPr>
-      </p:pic>
-      <p:pic>
-        <p:nvPicPr>
-          <p:cNvPr id="19" name="Picture 18">
-            <a:extLst>
-              <a:ext uri="{FF2B5EF4-FFF2-40B4-BE49-F238E27FC236}">
-                <a16:creationId xmlns:a16="http://schemas.microsoft.com/office/drawing/2014/main" id="{F1675111-76A9-C064-3779-45F4098EB825}"/>
-              </a:ext>
-            </a:extLst>
-          </p:cNvPr>
-          <p:cNvPicPr>
-            <a:picLocks noChangeAspect="1"/>
-          </p:cNvPicPr>
-          <p:nvPr/>
-        </p:nvPicPr>
-        <p:blipFill>
-          <a:blip r:embed="rId21"/>
-          <a:stretch>
-            <a:fillRect/>
-          </a:stretch>
-        </p:blipFill>
-        <p:spPr>
-          <a:xfrm>
-            <a:off x="1947672" y="1883664"/>
-            <a:ext cx="1682496" cy="1682496"/>
-          </a:xfrm>
-          <a:prstGeom prst="rect">
-            <a:avLst/>
-          </a:prstGeom>
-        </p:spPr>
-      </p:pic>
-      <p:grpSp>
-        <p:nvGrpSpPr>
-          <p:cNvPr id="31" name="Group 30">
-            <a:extLst>
-              <a:ext uri="{FF2B5EF4-FFF2-40B4-BE49-F238E27FC236}">
-                <a16:creationId xmlns:a16="http://schemas.microsoft.com/office/drawing/2014/main" id="{38B4E7E4-CDF1-A363-41B5-39FC230C5B3D}"/>
-              </a:ext>
-            </a:extLst>
-          </p:cNvPr>
-          <p:cNvGrpSpPr/>
-          <p:nvPr/>
-        </p:nvGrpSpPr>
-        <p:grpSpPr>
-          <a:xfrm>
-            <a:off x="5385816" y="2862072"/>
-            <a:ext cx="1476605" cy="822727"/>
-            <a:chOff x="5385816" y="2862072"/>
-            <a:chExt cx="1476605" cy="822727"/>
-          </a:xfrm>
-        </p:grpSpPr>
-        <p:pic>
-          <p:nvPicPr>
-            <p:cNvPr id="27" name="Picture 26">
-              <a:extLst>
-                <a:ext uri="{FF2B5EF4-FFF2-40B4-BE49-F238E27FC236}">
-                  <a16:creationId xmlns:a16="http://schemas.microsoft.com/office/drawing/2014/main" id="{A3346AAA-7D32-6F51-69A5-3E67350FDEAA}"/>
-                </a:ext>
-              </a:extLst>
-            </p:cNvPr>
-            <p:cNvPicPr>
-              <a:picLocks noChangeAspect="1"/>
-            </p:cNvPicPr>
-            <p:nvPr/>
-          </p:nvPicPr>
-          <p:blipFill rotWithShape="1">
-            <a:blip r:embed="rId22"/>
-            <a:srcRect b="47972"/>
-            <a:stretch/>
-          </p:blipFill>
-          <p:spPr>
-            <a:xfrm>
-              <a:off x="5385816" y="2862072"/>
-              <a:ext cx="914400" cy="761191"/>
-            </a:xfrm>
-            <a:prstGeom prst="rect">
-              <a:avLst/>
-            </a:prstGeom>
-          </p:spPr>
-        </p:pic>
-        <p:pic>
-          <p:nvPicPr>
-            <p:cNvPr id="30" name="Picture 29">
-              <a:extLst>
-                <a:ext uri="{FF2B5EF4-FFF2-40B4-BE49-F238E27FC236}">
-                  <a16:creationId xmlns:a16="http://schemas.microsoft.com/office/drawing/2014/main" id="{48C2F896-85F1-1B76-1757-0BE95BD90BE1}"/>
-                </a:ext>
-              </a:extLst>
-            </p:cNvPr>
-            <p:cNvPicPr>
-              <a:picLocks noChangeAspect="1"/>
-            </p:cNvPicPr>
-            <p:nvPr/>
-          </p:nvPicPr>
-          <p:blipFill rotWithShape="1">
-            <a:blip r:embed="rId22"/>
-            <a:srcRect l="-1020" t="53864" r="-1020"/>
-            <a:stretch/>
-          </p:blipFill>
-          <p:spPr>
-            <a:xfrm>
-              <a:off x="5948021" y="3009807"/>
-              <a:ext cx="914400" cy="674992"/>
-            </a:xfrm>
-            <a:prstGeom prst="rect">
-              <a:avLst/>
-            </a:prstGeom>
-          </p:spPr>
-        </p:pic>
-      </p:grpSp>
     </p:spTree>
   </p:cSld>
   <p:clrMapOvr>

</xml_diff>

<commit_message>
work of fuzzy ppt
</commit_message>
<xml_diff>
--- a/main_figures/Figures_Challenge1.pptx
+++ b/main_figures/Figures_Challenge1.pptx
@@ -3602,48 +3602,6 @@
           </a:p>
         </p:txBody>
       </p:sp>
-      <p:sp>
-        <p:nvSpPr>
-          <p:cNvPr id="98" name="TextBox 180">
-            <a:extLst>
-              <a:ext uri="{FF2B5EF4-FFF2-40B4-BE49-F238E27FC236}">
-                <a16:creationId xmlns:a16="http://schemas.microsoft.com/office/drawing/2014/main" id="{ACF6B259-DD77-1F49-A63F-7D4D37EE33F1}"/>
-              </a:ext>
-            </a:extLst>
-          </p:cNvPr>
-          <p:cNvSpPr txBox="1"/>
-          <p:nvPr/>
-        </p:nvSpPr>
-        <p:spPr>
-          <a:xfrm>
-            <a:off x="61611" y="3571836"/>
-            <a:ext cx="122258" cy="215444"/>
-          </a:xfrm>
-          <a:prstGeom prst="rect">
-            <a:avLst/>
-          </a:prstGeom>
-          <a:noFill/>
-        </p:spPr>
-        <p:txBody>
-          <a:bodyPr wrap="square" lIns="0" tIns="0" rIns="0" bIns="0" rtlCol="0">
-            <a:spAutoFit/>
-          </a:bodyPr>
-          <a:lstStyle/>
-          <a:p>
-            <a:r>
-              <a:rPr lang="en-US" sz="1400" b="1" dirty="0">
-                <a:latin typeface="Arial" pitchFamily="34" charset="0"/>
-                <a:cs typeface="Arial" pitchFamily="34" charset="0"/>
-              </a:rPr>
-              <a:t>b</a:t>
-            </a:r>
-            <a:endParaRPr lang="x-none" sz="1400" b="1" dirty="0">
-              <a:latin typeface="Arial" pitchFamily="34" charset="0"/>
-              <a:cs typeface="Arial" pitchFamily="34" charset="0"/>
-            </a:endParaRPr>
-          </a:p>
-        </p:txBody>
-      </p:sp>
       <p:pic>
         <p:nvPicPr>
           <p:cNvPr id="80" name="Gráfico 79">
@@ -3744,42 +3702,6 @@
           <a:xfrm>
             <a:off x="384645" y="5062454"/>
             <a:ext cx="2633338" cy="1540852"/>
-          </a:xfrm>
-          <a:prstGeom prst="rect">
-            <a:avLst/>
-          </a:prstGeom>
-        </p:spPr>
-      </p:pic>
-      <p:pic>
-        <p:nvPicPr>
-          <p:cNvPr id="20" name="Graphic 19">
-            <a:extLst>
-              <a:ext uri="{FF2B5EF4-FFF2-40B4-BE49-F238E27FC236}">
-                <a16:creationId xmlns:a16="http://schemas.microsoft.com/office/drawing/2014/main" id="{2B17FD3C-EDDE-B3BC-7118-AB90F6A12581}"/>
-              </a:ext>
-            </a:extLst>
-          </p:cNvPr>
-          <p:cNvPicPr>
-            <a:picLocks noChangeAspect="1"/>
-          </p:cNvPicPr>
-          <p:nvPr/>
-        </p:nvPicPr>
-        <p:blipFill>
-          <a:blip r:embed="rId10">
-            <a:extLst>
-              <a:ext uri="{96DAC541-7B7A-43D3-8B79-37D633B846F1}">
-                <asvg:svgBlip xmlns:asvg="http://schemas.microsoft.com/office/drawing/2016/SVG/main" r:embed="rId11"/>
-              </a:ext>
-            </a:extLst>
-          </a:blip>
-          <a:stretch>
-            <a:fillRect/>
-          </a:stretch>
-        </p:blipFill>
-        <p:spPr>
-          <a:xfrm>
-            <a:off x="330826" y="3576798"/>
-            <a:ext cx="2740976" cy="1370488"/>
           </a:xfrm>
           <a:prstGeom prst="rect">
             <a:avLst/>
@@ -3886,7 +3808,7 @@
           <p:nvPr/>
         </p:nvPicPr>
         <p:blipFill>
-          <a:blip r:embed="rId12"/>
+          <a:blip r:embed="rId10"/>
           <a:stretch>
             <a:fillRect/>
           </a:stretch>
@@ -3956,7 +3878,7 @@
               <p:nvPr/>
             </p:nvPicPr>
             <p:blipFill rotWithShape="1">
-              <a:blip r:embed="rId13"/>
+              <a:blip r:embed="rId11"/>
               <a:srcRect b="47972"/>
               <a:stretch/>
             </p:blipFill>
@@ -3985,7 +3907,7 @@
               <p:nvPr/>
             </p:nvPicPr>
             <p:blipFill rotWithShape="1">
-              <a:blip r:embed="rId13"/>
+              <a:blip r:embed="rId11"/>
               <a:srcRect l="-1020" t="53864" r="-1020"/>
               <a:stretch/>
             </p:blipFill>
@@ -4015,7 +3937,7 @@
             <p:nvPr/>
           </p:nvPicPr>
           <p:blipFill>
-            <a:blip r:embed="rId14"/>
+            <a:blip r:embed="rId12"/>
             <a:stretch>
               <a:fillRect/>
             </a:stretch>
@@ -4045,7 +3967,7 @@
             <p:nvPr/>
           </p:nvPicPr>
           <p:blipFill rotWithShape="1">
-            <a:blip r:embed="rId15"/>
+            <a:blip r:embed="rId13"/>
             <a:srcRect l="1689"/>
             <a:stretch/>
           </p:blipFill>
@@ -4094,7 +4016,7 @@
               <p:nvPr/>
             </p:nvPicPr>
             <p:blipFill>
-              <a:blip r:embed="rId16"/>
+              <a:blip r:embed="rId14"/>
               <a:stretch>
                 <a:fillRect/>
               </a:stretch>
@@ -4313,7 +4235,7 @@
               <p:nvPr/>
             </p:nvPicPr>
             <p:blipFill>
-              <a:blip r:embed="rId17"/>
+              <a:blip r:embed="rId15"/>
               <a:stretch>
                 <a:fillRect/>
               </a:stretch>
@@ -4343,7 +4265,7 @@
               <p:nvPr/>
             </p:nvPicPr>
             <p:blipFill>
-              <a:blip r:embed="rId18"/>
+              <a:blip r:embed="rId16"/>
               <a:stretch>
                 <a:fillRect/>
               </a:stretch>
@@ -4634,7 +4556,7 @@
             <p:nvPr/>
           </p:nvPicPr>
           <p:blipFill>
-            <a:blip r:embed="rId19"/>
+            <a:blip r:embed="rId17"/>
             <a:stretch>
               <a:fillRect/>
             </a:stretch>
@@ -4664,7 +4586,7 @@
             <p:nvPr/>
           </p:nvPicPr>
           <p:blipFill>
-            <a:blip r:embed="rId20"/>
+            <a:blip r:embed="rId18"/>
             <a:stretch>
               <a:fillRect/>
             </a:stretch>
@@ -4694,7 +4616,7 @@
             <p:nvPr/>
           </p:nvPicPr>
           <p:blipFill>
-            <a:blip r:embed="rId21"/>
+            <a:blip r:embed="rId19"/>
             <a:stretch>
               <a:fillRect/>
             </a:stretch>
@@ -4724,7 +4646,7 @@
             <p:nvPr/>
           </p:nvPicPr>
           <p:blipFill rotWithShape="1">
-            <a:blip r:embed="rId22"/>
+            <a:blip r:embed="rId20"/>
             <a:srcRect r="1762"/>
             <a:stretch/>
           </p:blipFill>
@@ -4781,6 +4703,99 @@
           </a:p>
         </p:txBody>
       </p:sp>
+      <p:grpSp>
+        <p:nvGrpSpPr>
+          <p:cNvPr id="39" name="Group 38">
+            <a:extLst>
+              <a:ext uri="{FF2B5EF4-FFF2-40B4-BE49-F238E27FC236}">
+                <a16:creationId xmlns:a16="http://schemas.microsoft.com/office/drawing/2014/main" id="{6089D0DE-4F0E-3395-DE43-3C1D4E8972C5}"/>
+              </a:ext>
+            </a:extLst>
+          </p:cNvPr>
+          <p:cNvGrpSpPr/>
+          <p:nvPr/>
+        </p:nvGrpSpPr>
+        <p:grpSpPr>
+          <a:xfrm>
+            <a:off x="61611" y="3571836"/>
+            <a:ext cx="3147933" cy="1283628"/>
+            <a:chOff x="61611" y="3571836"/>
+            <a:chExt cx="3147933" cy="1283628"/>
+          </a:xfrm>
+        </p:grpSpPr>
+        <p:sp>
+          <p:nvSpPr>
+            <p:cNvPr id="98" name="TextBox 180">
+              <a:extLst>
+                <a:ext uri="{FF2B5EF4-FFF2-40B4-BE49-F238E27FC236}">
+                  <a16:creationId xmlns:a16="http://schemas.microsoft.com/office/drawing/2014/main" id="{ACF6B259-DD77-1F49-A63F-7D4D37EE33F1}"/>
+                </a:ext>
+              </a:extLst>
+            </p:cNvPr>
+            <p:cNvSpPr txBox="1"/>
+            <p:nvPr/>
+          </p:nvSpPr>
+          <p:spPr>
+            <a:xfrm>
+              <a:off x="61611" y="3571836"/>
+              <a:ext cx="122258" cy="215444"/>
+            </a:xfrm>
+            <a:prstGeom prst="rect">
+              <a:avLst/>
+            </a:prstGeom>
+            <a:noFill/>
+          </p:spPr>
+          <p:txBody>
+            <a:bodyPr wrap="square" lIns="0" tIns="0" rIns="0" bIns="0" rtlCol="0">
+              <a:spAutoFit/>
+            </a:bodyPr>
+            <a:lstStyle/>
+            <a:p>
+              <a:r>
+                <a:rPr lang="en-US" sz="1400" b="1" dirty="0">
+                  <a:latin typeface="Arial" pitchFamily="34" charset="0"/>
+                  <a:cs typeface="Arial" pitchFamily="34" charset="0"/>
+                </a:rPr>
+                <a:t>b</a:t>
+              </a:r>
+              <a:endParaRPr lang="x-none" sz="1400" b="1" dirty="0">
+                <a:latin typeface="Arial" pitchFamily="34" charset="0"/>
+                <a:cs typeface="Arial" pitchFamily="34" charset="0"/>
+              </a:endParaRPr>
+            </a:p>
+          </p:txBody>
+        </p:sp>
+        <p:pic>
+          <p:nvPicPr>
+            <p:cNvPr id="38" name="Picture 37">
+              <a:extLst>
+                <a:ext uri="{FF2B5EF4-FFF2-40B4-BE49-F238E27FC236}">
+                  <a16:creationId xmlns:a16="http://schemas.microsoft.com/office/drawing/2014/main" id="{CA47B9B1-0A86-27CA-887E-2C3361C7BCE3}"/>
+                </a:ext>
+              </a:extLst>
+            </p:cNvPr>
+            <p:cNvPicPr>
+              <a:picLocks noChangeAspect="1"/>
+            </p:cNvPicPr>
+            <p:nvPr/>
+          </p:nvPicPr>
+          <p:blipFill>
+            <a:blip r:embed="rId21"/>
+            <a:stretch>
+              <a:fillRect/>
+            </a:stretch>
+          </p:blipFill>
+          <p:spPr>
+            <a:xfrm>
+              <a:off x="329184" y="3575304"/>
+              <a:ext cx="2880360" cy="1280160"/>
+            </a:xfrm>
+            <a:prstGeom prst="rect">
+              <a:avLst/>
+            </a:prstGeom>
+          </p:spPr>
+        </p:pic>
+      </p:grpSp>
     </p:spTree>
   </p:cSld>
   <p:clrMapOvr>

</xml_diff>

<commit_message>
fixed fig 2b, 2d fuzzyness
</commit_message>
<xml_diff>
--- a/main_figures/Figures_Challenge1.pptx
+++ b/main_figures/Figures_Challenge1.pptx
@@ -197,7 +197,7 @@
           <a:p>
             <a:fld id="{BB10F362-B20B-AA4C-94D1-126690D75D93}" type="datetimeFigureOut">
               <a:rPr lang="en-US" smtClean="0"/>
-              <a:t>12/28/23</a:t>
+              <a:t>12/29/23</a:t>
             </a:fld>
             <a:endParaRPr lang="en-US"/>
           </a:p>
@@ -679,7 +679,7 @@
           <a:p>
             <a:fld id="{C2C0E96D-F107-FA4A-BD5D-F7715BECAD01}" type="datetimeFigureOut">
               <a:rPr lang="es-ES_tradnl" smtClean="0"/>
-              <a:t>28/12/23</a:t>
+              <a:t>29/12/23</a:t>
             </a:fld>
             <a:endParaRPr lang="es-ES_tradnl"/>
           </a:p>
@@ -849,7 +849,7 @@
           <a:p>
             <a:fld id="{C2C0E96D-F107-FA4A-BD5D-F7715BECAD01}" type="datetimeFigureOut">
               <a:rPr lang="es-ES_tradnl" smtClean="0"/>
-              <a:t>28/12/23</a:t>
+              <a:t>29/12/23</a:t>
             </a:fld>
             <a:endParaRPr lang="es-ES_tradnl"/>
           </a:p>
@@ -1029,7 +1029,7 @@
           <a:p>
             <a:fld id="{C2C0E96D-F107-FA4A-BD5D-F7715BECAD01}" type="datetimeFigureOut">
               <a:rPr lang="es-ES_tradnl" smtClean="0"/>
-              <a:t>28/12/23</a:t>
+              <a:t>29/12/23</a:t>
             </a:fld>
             <a:endParaRPr lang="es-ES_tradnl"/>
           </a:p>
@@ -1199,7 +1199,7 @@
           <a:p>
             <a:fld id="{C2C0E96D-F107-FA4A-BD5D-F7715BECAD01}" type="datetimeFigureOut">
               <a:rPr lang="es-ES_tradnl" smtClean="0"/>
-              <a:t>28/12/23</a:t>
+              <a:t>29/12/23</a:t>
             </a:fld>
             <a:endParaRPr lang="es-ES_tradnl"/>
           </a:p>
@@ -1443,7 +1443,7 @@
           <a:p>
             <a:fld id="{C2C0E96D-F107-FA4A-BD5D-F7715BECAD01}" type="datetimeFigureOut">
               <a:rPr lang="es-ES_tradnl" smtClean="0"/>
-              <a:t>28/12/23</a:t>
+              <a:t>29/12/23</a:t>
             </a:fld>
             <a:endParaRPr lang="es-ES_tradnl"/>
           </a:p>
@@ -1675,7 +1675,7 @@
           <a:p>
             <a:fld id="{C2C0E96D-F107-FA4A-BD5D-F7715BECAD01}" type="datetimeFigureOut">
               <a:rPr lang="es-ES_tradnl" smtClean="0"/>
-              <a:t>28/12/23</a:t>
+              <a:t>29/12/23</a:t>
             </a:fld>
             <a:endParaRPr lang="es-ES_tradnl"/>
           </a:p>
@@ -2042,7 +2042,7 @@
           <a:p>
             <a:fld id="{C2C0E96D-F107-FA4A-BD5D-F7715BECAD01}" type="datetimeFigureOut">
               <a:rPr lang="es-ES_tradnl" smtClean="0"/>
-              <a:t>28/12/23</a:t>
+              <a:t>29/12/23</a:t>
             </a:fld>
             <a:endParaRPr lang="es-ES_tradnl"/>
           </a:p>
@@ -2160,7 +2160,7 @@
           <a:p>
             <a:fld id="{C2C0E96D-F107-FA4A-BD5D-F7715BECAD01}" type="datetimeFigureOut">
               <a:rPr lang="es-ES_tradnl" smtClean="0"/>
-              <a:t>28/12/23</a:t>
+              <a:t>29/12/23</a:t>
             </a:fld>
             <a:endParaRPr lang="es-ES_tradnl"/>
           </a:p>
@@ -2255,7 +2255,7 @@
           <a:p>
             <a:fld id="{C2C0E96D-F107-FA4A-BD5D-F7715BECAD01}" type="datetimeFigureOut">
               <a:rPr lang="es-ES_tradnl" smtClean="0"/>
-              <a:t>28/12/23</a:t>
+              <a:t>29/12/23</a:t>
             </a:fld>
             <a:endParaRPr lang="es-ES_tradnl"/>
           </a:p>
@@ -2532,7 +2532,7 @@
           <a:p>
             <a:fld id="{C2C0E96D-F107-FA4A-BD5D-F7715BECAD01}" type="datetimeFigureOut">
               <a:rPr lang="es-ES_tradnl" smtClean="0"/>
-              <a:t>28/12/23</a:t>
+              <a:t>29/12/23</a:t>
             </a:fld>
             <a:endParaRPr lang="es-ES_tradnl"/>
           </a:p>
@@ -2789,7 +2789,7 @@
           <a:p>
             <a:fld id="{C2C0E96D-F107-FA4A-BD5D-F7715BECAD01}" type="datetimeFigureOut">
               <a:rPr lang="es-ES_tradnl" smtClean="0"/>
-              <a:t>28/12/23</a:t>
+              <a:t>29/12/23</a:t>
             </a:fld>
             <a:endParaRPr lang="es-ES_tradnl"/>
           </a:p>
@@ -3002,7 +3002,7 @@
           <a:p>
             <a:fld id="{C2C0E96D-F107-FA4A-BD5D-F7715BECAD01}" type="datetimeFigureOut">
               <a:rPr lang="es-ES_tradnl" smtClean="0"/>
-              <a:t>28/12/23</a:t>
+              <a:t>29/12/23</a:t>
             </a:fld>
             <a:endParaRPr lang="es-ES_tradnl"/>
           </a:p>
@@ -3602,41 +3602,6 @@
           </a:p>
         </p:txBody>
       </p:sp>
-      <p:pic>
-        <p:nvPicPr>
-          <p:cNvPr id="80" name="Gráfico 79">
-            <a:extLst>
-              <a:ext uri="{FF2B5EF4-FFF2-40B4-BE49-F238E27FC236}">
-                <a16:creationId xmlns:a16="http://schemas.microsoft.com/office/drawing/2014/main" id="{406107A0-8EAD-2F41-A9B7-D87D4647806A}"/>
-              </a:ext>
-            </a:extLst>
-          </p:cNvPr>
-          <p:cNvPicPr>
-            <a:picLocks noChangeAspect="1"/>
-          </p:cNvPicPr>
-          <p:nvPr/>
-        </p:nvPicPr>
-        <p:blipFill rotWithShape="1">
-          <a:blip r:embed="rId7">
-            <a:extLst>
-              <a:ext uri="{96DAC541-7B7A-43D3-8B79-37D633B846F1}">
-                <asvg:svgBlip xmlns:asvg="http://schemas.microsoft.com/office/drawing/2016/SVG/main" r:embed="rId8"/>
-              </a:ext>
-            </a:extLst>
-          </a:blip>
-          <a:srcRect l="8078" t="46581" b="42876"/>
-          <a:stretch/>
-        </p:blipFill>
-        <p:spPr>
-          <a:xfrm>
-            <a:off x="250716" y="6603306"/>
-            <a:ext cx="2978269" cy="170794"/>
-          </a:xfrm>
-          <a:prstGeom prst="rect">
-            <a:avLst/>
-          </a:prstGeom>
-        </p:spPr>
-      </p:pic>
       <p:sp>
         <p:nvSpPr>
           <p:cNvPr id="115" name="TextBox 180">
@@ -3694,7 +3659,7 @@
           <p:nvPr/>
         </p:nvPicPr>
         <p:blipFill rotWithShape="1">
-          <a:blip r:embed="rId9"/>
+          <a:blip r:embed="rId7"/>
           <a:srcRect b="26859"/>
           <a:stretch/>
         </p:blipFill>
@@ -3808,7 +3773,7 @@
           <p:nvPr/>
         </p:nvPicPr>
         <p:blipFill>
-          <a:blip r:embed="rId10"/>
+          <a:blip r:embed="rId8"/>
           <a:stretch>
             <a:fillRect/>
           </a:stretch>
@@ -3878,7 +3843,7 @@
               <p:nvPr/>
             </p:nvPicPr>
             <p:blipFill rotWithShape="1">
-              <a:blip r:embed="rId11"/>
+              <a:blip r:embed="rId9"/>
               <a:srcRect b="47972"/>
               <a:stretch/>
             </p:blipFill>
@@ -3907,7 +3872,7 @@
               <p:nvPr/>
             </p:nvPicPr>
             <p:blipFill rotWithShape="1">
-              <a:blip r:embed="rId11"/>
+              <a:blip r:embed="rId9"/>
               <a:srcRect l="-1020" t="53864" r="-1020"/>
               <a:stretch/>
             </p:blipFill>
@@ -3937,7 +3902,7 @@
             <p:nvPr/>
           </p:nvPicPr>
           <p:blipFill>
-            <a:blip r:embed="rId12"/>
+            <a:blip r:embed="rId10"/>
             <a:stretch>
               <a:fillRect/>
             </a:stretch>
@@ -3967,7 +3932,7 @@
             <p:nvPr/>
           </p:nvPicPr>
           <p:blipFill rotWithShape="1">
-            <a:blip r:embed="rId13"/>
+            <a:blip r:embed="rId11"/>
             <a:srcRect l="1689"/>
             <a:stretch/>
           </p:blipFill>
@@ -4016,7 +3981,7 @@
               <p:nvPr/>
             </p:nvPicPr>
             <p:blipFill>
-              <a:blip r:embed="rId14"/>
+              <a:blip r:embed="rId12"/>
               <a:stretch>
                 <a:fillRect/>
               </a:stretch>
@@ -4235,7 +4200,7 @@
               <p:nvPr/>
             </p:nvPicPr>
             <p:blipFill>
-              <a:blip r:embed="rId15"/>
+              <a:blip r:embed="rId13"/>
               <a:stretch>
                 <a:fillRect/>
               </a:stretch>
@@ -4265,7 +4230,7 @@
               <p:nvPr/>
             </p:nvPicPr>
             <p:blipFill>
-              <a:blip r:embed="rId16"/>
+              <a:blip r:embed="rId14"/>
               <a:stretch>
                 <a:fillRect/>
               </a:stretch>
@@ -4556,7 +4521,7 @@
             <p:nvPr/>
           </p:nvPicPr>
           <p:blipFill>
-            <a:blip r:embed="rId17"/>
+            <a:blip r:embed="rId15"/>
             <a:stretch>
               <a:fillRect/>
             </a:stretch>
@@ -4586,7 +4551,7 @@
             <p:nvPr/>
           </p:nvPicPr>
           <p:blipFill>
-            <a:blip r:embed="rId18"/>
+            <a:blip r:embed="rId16"/>
             <a:stretch>
               <a:fillRect/>
             </a:stretch>
@@ -4616,7 +4581,7 @@
             <p:nvPr/>
           </p:nvPicPr>
           <p:blipFill>
-            <a:blip r:embed="rId19"/>
+            <a:blip r:embed="rId17"/>
             <a:stretch>
               <a:fillRect/>
             </a:stretch>
@@ -4646,7 +4611,7 @@
             <p:nvPr/>
           </p:nvPicPr>
           <p:blipFill rotWithShape="1">
-            <a:blip r:embed="rId20"/>
+            <a:blip r:embed="rId18"/>
             <a:srcRect r="1762"/>
             <a:stretch/>
           </p:blipFill>
@@ -4705,10 +4670,10 @@
       </p:sp>
       <p:grpSp>
         <p:nvGrpSpPr>
-          <p:cNvPr id="39" name="Group 38">
+          <p:cNvPr id="8" name="Group 7">
             <a:extLst>
               <a:ext uri="{FF2B5EF4-FFF2-40B4-BE49-F238E27FC236}">
-                <a16:creationId xmlns:a16="http://schemas.microsoft.com/office/drawing/2014/main" id="{6089D0DE-4F0E-3395-DE43-3C1D4E8972C5}"/>
+                <a16:creationId xmlns:a16="http://schemas.microsoft.com/office/drawing/2014/main" id="{57F446DF-787F-7BE1-370B-312BD8CEE340}"/>
               </a:ext>
             </a:extLst>
           </p:cNvPr>
@@ -4717,12 +4682,42 @@
         </p:nvGrpSpPr>
         <p:grpSpPr>
           <a:xfrm>
-            <a:off x="61611" y="3571836"/>
-            <a:ext cx="3147933" cy="1283628"/>
-            <a:chOff x="61611" y="3571836"/>
-            <a:chExt cx="3147933" cy="1283628"/>
+            <a:off x="61611" y="3566329"/>
+            <a:ext cx="3157791" cy="1371600"/>
+            <a:chOff x="61611" y="3566329"/>
+            <a:chExt cx="3157791" cy="1371600"/>
           </a:xfrm>
         </p:grpSpPr>
+        <p:pic>
+          <p:nvPicPr>
+            <p:cNvPr id="5" name="Picture 4">
+              <a:extLst>
+                <a:ext uri="{FF2B5EF4-FFF2-40B4-BE49-F238E27FC236}">
+                  <a16:creationId xmlns:a16="http://schemas.microsoft.com/office/drawing/2014/main" id="{2AA80024-322A-9081-DB14-782751B03CD3}"/>
+                </a:ext>
+              </a:extLst>
+            </p:cNvPr>
+            <p:cNvPicPr>
+              <a:picLocks noChangeAspect="1"/>
+            </p:cNvPicPr>
+            <p:nvPr/>
+          </p:nvPicPr>
+          <p:blipFill>
+            <a:blip r:embed="rId19"/>
+            <a:stretch>
+              <a:fillRect/>
+            </a:stretch>
+          </p:blipFill>
+          <p:spPr>
+            <a:xfrm>
+              <a:off x="133302" y="3566329"/>
+              <a:ext cx="3086100" cy="1371600"/>
+            </a:xfrm>
+            <a:prstGeom prst="rect">
+              <a:avLst/>
+            </a:prstGeom>
+          </p:spPr>
+        </p:pic>
         <p:sp>
           <p:nvSpPr>
             <p:cNvPr id="98" name="TextBox 180">
@@ -4765,37 +4760,37 @@
             </a:p>
           </p:txBody>
         </p:sp>
-        <p:pic>
-          <p:nvPicPr>
-            <p:cNvPr id="38" name="Picture 37">
-              <a:extLst>
-                <a:ext uri="{FF2B5EF4-FFF2-40B4-BE49-F238E27FC236}">
-                  <a16:creationId xmlns:a16="http://schemas.microsoft.com/office/drawing/2014/main" id="{CA47B9B1-0A86-27CA-887E-2C3361C7BCE3}"/>
-                </a:ext>
-              </a:extLst>
-            </p:cNvPr>
-            <p:cNvPicPr>
-              <a:picLocks noChangeAspect="1"/>
-            </p:cNvPicPr>
-            <p:nvPr/>
-          </p:nvPicPr>
-          <p:blipFill>
-            <a:blip r:embed="rId21"/>
-            <a:stretch>
-              <a:fillRect/>
-            </a:stretch>
-          </p:blipFill>
-          <p:spPr>
-            <a:xfrm>
-              <a:off x="329184" y="3575304"/>
-              <a:ext cx="2880360" cy="1280160"/>
-            </a:xfrm>
-            <a:prstGeom prst="rect">
-              <a:avLst/>
-            </a:prstGeom>
-          </p:spPr>
-        </p:pic>
       </p:grpSp>
+      <p:pic>
+        <p:nvPicPr>
+          <p:cNvPr id="13" name="Picture 12">
+            <a:extLst>
+              <a:ext uri="{FF2B5EF4-FFF2-40B4-BE49-F238E27FC236}">
+                <a16:creationId xmlns:a16="http://schemas.microsoft.com/office/drawing/2014/main" id="{9917457D-94A0-579D-EF3B-A75A5C0DE9F7}"/>
+              </a:ext>
+            </a:extLst>
+          </p:cNvPr>
+          <p:cNvPicPr>
+            <a:picLocks noChangeAspect="1"/>
+          </p:cNvPicPr>
+          <p:nvPr/>
+        </p:nvPicPr>
+        <p:blipFill>
+          <a:blip r:embed="rId20"/>
+          <a:stretch>
+            <a:fillRect/>
+          </a:stretch>
+        </p:blipFill>
+        <p:spPr>
+          <a:xfrm>
+            <a:off x="514604" y="6635844"/>
+            <a:ext cx="2463800" cy="107950"/>
+          </a:xfrm>
+          <a:prstGeom prst="rect">
+            <a:avLst/>
+          </a:prstGeom>
+        </p:spPr>
+      </p:pic>
     </p:spTree>
   </p:cSld>
   <p:clrMapOvr>

</xml_diff>